<commit_message>
Updates to text and images based upon feedback
</commit_message>
<xml_diff>
--- a/ADF Dev Ops.pptx
+++ b/ADF Dev Ops.pptx
@@ -7611,8 +7611,8 @@
         </p:nvSpPr>
         <p:spPr>
           <a:xfrm>
-            <a:off x="160316" y="5198218"/>
-            <a:ext cx="11648626" cy="1600438"/>
+            <a:off x="160316" y="5074648"/>
+            <a:ext cx="11648626" cy="1785104"/>
           </a:xfrm>
           <a:prstGeom prst="rect">
             <a:avLst/>
@@ -7637,7 +7637,17 @@
             </a:pPr>
             <a:r>
               <a:rPr lang="en-US" sz="1200" dirty="0"/>
-              <a:t>Each branch will integration to the same Git repo.  </a:t>
+              <a:t>You will have one data factory for your master branch and one additional data factory for each feature branch. </a:t>
+            </a:r>
+          </a:p>
+          <a:p>
+            <a:pPr marL="342900" indent="-342900">
+              <a:buFont typeface="Arial" panose="020B0604020202020204" pitchFamily="34" charset="0"/>
+              <a:buChar char="•"/>
+            </a:pPr>
+            <a:r>
+              <a:rPr lang="en-US" sz="1200" dirty="0"/>
+              <a:t>Each branch will integrate to the same Git repo.  </a:t>
             </a:r>
           </a:p>
           <a:p>

</xml_diff>

<commit_message>
Updates to support mulitple environments
</commit_message>
<xml_diff>
--- a/ADF Dev Ops.pptx
+++ b/ADF Dev Ops.pptx
@@ -6,7 +6,8 @@
   </p:sldMasterIdLst>
   <p:sldIdLst>
     <p:sldId id="256" r:id="rId5"/>
-    <p:sldId id="262" r:id="rId6"/>
+    <p:sldId id="263" r:id="rId6"/>
+    <p:sldId id="262" r:id="rId7"/>
   </p:sldIdLst>
   <p:sldSz cx="12192000" cy="6858000"/>
   <p:notesSz cx="6858000" cy="9144000"/>
@@ -2658,7 +2659,7 @@
           <a:p>
             <a:fld id="{D7A2CEBF-19A8-45A4-87F4-7E255B5A8DA3}" type="datetimeFigureOut">
               <a:rPr lang="en-US" smtClean="0"/>
-              <a:t>5/29/2020</a:t>
+              <a:t>8/12/2020</a:t>
             </a:fld>
             <a:endParaRPr lang="en-US" dirty="0"/>
           </a:p>
@@ -2856,7 +2857,7 @@
           <a:p>
             <a:fld id="{D7A2CEBF-19A8-45A4-87F4-7E255B5A8DA3}" type="datetimeFigureOut">
               <a:rPr lang="en-US" smtClean="0"/>
-              <a:t>5/29/2020</a:t>
+              <a:t>8/12/2020</a:t>
             </a:fld>
             <a:endParaRPr lang="en-US" dirty="0"/>
           </a:p>
@@ -3064,7 +3065,7 @@
           <a:p>
             <a:fld id="{D7A2CEBF-19A8-45A4-87F4-7E255B5A8DA3}" type="datetimeFigureOut">
               <a:rPr lang="en-US" smtClean="0"/>
-              <a:t>5/29/2020</a:t>
+              <a:t>8/12/2020</a:t>
             </a:fld>
             <a:endParaRPr lang="en-US" dirty="0"/>
           </a:p>
@@ -3262,7 +3263,7 @@
           <a:p>
             <a:fld id="{D7A2CEBF-19A8-45A4-87F4-7E255B5A8DA3}" type="datetimeFigureOut">
               <a:rPr lang="en-US" smtClean="0"/>
-              <a:t>5/29/2020</a:t>
+              <a:t>8/12/2020</a:t>
             </a:fld>
             <a:endParaRPr lang="en-US" dirty="0"/>
           </a:p>
@@ -3537,7 +3538,7 @@
           <a:p>
             <a:fld id="{D7A2CEBF-19A8-45A4-87F4-7E255B5A8DA3}" type="datetimeFigureOut">
               <a:rPr lang="en-US" smtClean="0"/>
-              <a:t>5/29/2020</a:t>
+              <a:t>8/12/2020</a:t>
             </a:fld>
             <a:endParaRPr lang="en-US" dirty="0"/>
           </a:p>
@@ -3802,7 +3803,7 @@
           <a:p>
             <a:fld id="{D7A2CEBF-19A8-45A4-87F4-7E255B5A8DA3}" type="datetimeFigureOut">
               <a:rPr lang="en-US" smtClean="0"/>
-              <a:t>5/29/2020</a:t>
+              <a:t>8/12/2020</a:t>
             </a:fld>
             <a:endParaRPr lang="en-US" dirty="0"/>
           </a:p>
@@ -4214,7 +4215,7 @@
           <a:p>
             <a:fld id="{D7A2CEBF-19A8-45A4-87F4-7E255B5A8DA3}" type="datetimeFigureOut">
               <a:rPr lang="en-US" smtClean="0"/>
-              <a:t>5/29/2020</a:t>
+              <a:t>8/12/2020</a:t>
             </a:fld>
             <a:endParaRPr lang="en-US" dirty="0"/>
           </a:p>
@@ -4355,7 +4356,7 @@
           <a:p>
             <a:fld id="{D7A2CEBF-19A8-45A4-87F4-7E255B5A8DA3}" type="datetimeFigureOut">
               <a:rPr lang="en-US" smtClean="0"/>
-              <a:t>5/29/2020</a:t>
+              <a:t>8/12/2020</a:t>
             </a:fld>
             <a:endParaRPr lang="en-US" dirty="0"/>
           </a:p>
@@ -4468,7 +4469,7 @@
           <a:p>
             <a:fld id="{D7A2CEBF-19A8-45A4-87F4-7E255B5A8DA3}" type="datetimeFigureOut">
               <a:rPr lang="en-US" smtClean="0"/>
-              <a:t>5/29/2020</a:t>
+              <a:t>8/12/2020</a:t>
             </a:fld>
             <a:endParaRPr lang="en-US" dirty="0"/>
           </a:p>
@@ -4779,7 +4780,7 @@
           <a:p>
             <a:fld id="{D7A2CEBF-19A8-45A4-87F4-7E255B5A8DA3}" type="datetimeFigureOut">
               <a:rPr lang="en-US" smtClean="0"/>
-              <a:t>5/29/2020</a:t>
+              <a:t>8/12/2020</a:t>
             </a:fld>
             <a:endParaRPr lang="en-US" dirty="0"/>
           </a:p>
@@ -5067,7 +5068,7 @@
           <a:p>
             <a:fld id="{D7A2CEBF-19A8-45A4-87F4-7E255B5A8DA3}" type="datetimeFigureOut">
               <a:rPr lang="en-US" smtClean="0"/>
-              <a:t>5/29/2020</a:t>
+              <a:t>8/12/2020</a:t>
             </a:fld>
             <a:endParaRPr lang="en-US" dirty="0"/>
           </a:p>
@@ -5308,7 +5309,7 @@
           <a:p>
             <a:fld id="{D7A2CEBF-19A8-45A4-87F4-7E255B5A8DA3}" type="datetimeFigureOut">
               <a:rPr lang="en-US" smtClean="0"/>
-              <a:t>5/29/2020</a:t>
+              <a:t>8/12/2020</a:t>
             </a:fld>
             <a:endParaRPr lang="en-US" dirty="0"/>
           </a:p>
@@ -7123,6 +7124,2918 @@
       </p:grpSpPr>
       <p:sp>
         <p:nvSpPr>
+          <p:cNvPr id="33" name="Title 1">
+            <a:extLst>
+              <a:ext uri="{FF2B5EF4-FFF2-40B4-BE49-F238E27FC236}">
+                <a16:creationId xmlns:a16="http://schemas.microsoft.com/office/drawing/2014/main" id="{E5AA6774-BAB0-435D-B549-E23323D367BB}"/>
+              </a:ext>
+            </a:extLst>
+          </p:cNvPr>
+          <p:cNvSpPr>
+            <a:spLocks noGrp="1"/>
+          </p:cNvSpPr>
+          <p:nvPr>
+            <p:ph type="ctrTitle"/>
+          </p:nvPr>
+        </p:nvSpPr>
+        <p:spPr>
+          <a:xfrm>
+            <a:off x="189471" y="125584"/>
+            <a:ext cx="9144000" cy="549918"/>
+          </a:xfrm>
+        </p:spPr>
+        <p:txBody>
+          <a:bodyPr>
+            <a:noAutofit/>
+          </a:bodyPr>
+          <a:lstStyle/>
+          <a:p>
+            <a:pPr algn="l"/>
+            <a:r>
+              <a:rPr lang="en-US" sz="2800" dirty="0"/>
+              <a:t>ADF Dev Ops Source Control (Environments) </a:t>
+            </a:r>
+          </a:p>
+        </p:txBody>
+      </p:sp>
+      <p:sp>
+        <p:nvSpPr>
+          <p:cNvPr id="9" name="Rectangle 8">
+            <a:extLst>
+              <a:ext uri="{FF2B5EF4-FFF2-40B4-BE49-F238E27FC236}">
+                <a16:creationId xmlns:a16="http://schemas.microsoft.com/office/drawing/2014/main" id="{A08826A4-D08B-4440-90E1-B26FBE280BC7}"/>
+              </a:ext>
+            </a:extLst>
+          </p:cNvPr>
+          <p:cNvSpPr/>
+          <p:nvPr/>
+        </p:nvSpPr>
+        <p:spPr>
+          <a:xfrm>
+            <a:off x="706829" y="1885516"/>
+            <a:ext cx="2048403" cy="284205"/>
+          </a:xfrm>
+          <a:prstGeom prst="rect">
+            <a:avLst/>
+          </a:prstGeom>
+          <a:solidFill>
+            <a:schemeClr val="bg1">
+              <a:lumMod val="85000"/>
+            </a:schemeClr>
+          </a:solidFill>
+          <a:ln>
+            <a:solidFill>
+              <a:schemeClr val="accent5">
+                <a:lumMod val="60000"/>
+                <a:lumOff val="40000"/>
+              </a:schemeClr>
+            </a:solidFill>
+          </a:ln>
+        </p:spPr>
+        <p:style>
+          <a:lnRef idx="2">
+            <a:schemeClr val="accent1">
+              <a:shade val="50000"/>
+            </a:schemeClr>
+          </a:lnRef>
+          <a:fillRef idx="1">
+            <a:schemeClr val="accent1"/>
+          </a:fillRef>
+          <a:effectRef idx="0">
+            <a:schemeClr val="accent1"/>
+          </a:effectRef>
+          <a:fontRef idx="minor">
+            <a:schemeClr val="lt1"/>
+          </a:fontRef>
+        </p:style>
+        <p:txBody>
+          <a:bodyPr rtlCol="0" anchor="ctr"/>
+          <a:lstStyle/>
+          <a:p>
+            <a:pPr algn="ctr"/>
+            <a:r>
+              <a:rPr lang="en-US" sz="1400" dirty="0">
+                <a:solidFill>
+                  <a:schemeClr val="tx1"/>
+                </a:solidFill>
+              </a:rPr>
+              <a:t>Data Factory (Work Area)</a:t>
+            </a:r>
+          </a:p>
+        </p:txBody>
+      </p:sp>
+      <p:sp>
+        <p:nvSpPr>
+          <p:cNvPr id="13" name="Rectangle 12">
+            <a:extLst>
+              <a:ext uri="{FF2B5EF4-FFF2-40B4-BE49-F238E27FC236}">
+                <a16:creationId xmlns:a16="http://schemas.microsoft.com/office/drawing/2014/main" id="{FE9E68F1-C63F-45F9-B052-41266F4B624E}"/>
+              </a:ext>
+            </a:extLst>
+          </p:cNvPr>
+          <p:cNvSpPr/>
+          <p:nvPr/>
+        </p:nvSpPr>
+        <p:spPr>
+          <a:xfrm>
+            <a:off x="3506177" y="1885516"/>
+            <a:ext cx="2048403" cy="284205"/>
+          </a:xfrm>
+          <a:prstGeom prst="rect">
+            <a:avLst/>
+          </a:prstGeom>
+          <a:solidFill>
+            <a:schemeClr val="bg1">
+              <a:lumMod val="85000"/>
+            </a:schemeClr>
+          </a:solidFill>
+          <a:ln>
+            <a:solidFill>
+              <a:schemeClr val="accent5">
+                <a:lumMod val="60000"/>
+                <a:lumOff val="40000"/>
+              </a:schemeClr>
+            </a:solidFill>
+          </a:ln>
+        </p:spPr>
+        <p:style>
+          <a:lnRef idx="2">
+            <a:schemeClr val="accent1">
+              <a:shade val="50000"/>
+            </a:schemeClr>
+          </a:lnRef>
+          <a:fillRef idx="1">
+            <a:schemeClr val="accent1"/>
+          </a:fillRef>
+          <a:effectRef idx="0">
+            <a:schemeClr val="accent1"/>
+          </a:effectRef>
+          <a:fontRef idx="minor">
+            <a:schemeClr val="lt1"/>
+          </a:fontRef>
+        </p:style>
+        <p:txBody>
+          <a:bodyPr rtlCol="0" anchor="ctr"/>
+          <a:lstStyle/>
+          <a:p>
+            <a:pPr algn="ctr"/>
+            <a:r>
+              <a:rPr lang="en-US" sz="1400" dirty="0">
+                <a:solidFill>
+                  <a:schemeClr val="tx1"/>
+                </a:solidFill>
+              </a:rPr>
+              <a:t>Data Factory (Dev)</a:t>
+            </a:r>
+          </a:p>
+        </p:txBody>
+      </p:sp>
+      <p:sp>
+        <p:nvSpPr>
+          <p:cNvPr id="15" name="Rectangle 14">
+            <a:extLst>
+              <a:ext uri="{FF2B5EF4-FFF2-40B4-BE49-F238E27FC236}">
+                <a16:creationId xmlns:a16="http://schemas.microsoft.com/office/drawing/2014/main" id="{FF64D9AB-20A6-48A4-8F1B-C8ECB88A942A}"/>
+              </a:ext>
+            </a:extLst>
+          </p:cNvPr>
+          <p:cNvSpPr/>
+          <p:nvPr/>
+        </p:nvSpPr>
+        <p:spPr>
+          <a:xfrm>
+            <a:off x="5901979" y="1885516"/>
+            <a:ext cx="2048403" cy="284205"/>
+          </a:xfrm>
+          <a:prstGeom prst="rect">
+            <a:avLst/>
+          </a:prstGeom>
+          <a:solidFill>
+            <a:schemeClr val="bg1">
+              <a:lumMod val="85000"/>
+            </a:schemeClr>
+          </a:solidFill>
+          <a:ln>
+            <a:solidFill>
+              <a:schemeClr val="accent5">
+                <a:lumMod val="60000"/>
+                <a:lumOff val="40000"/>
+              </a:schemeClr>
+            </a:solidFill>
+          </a:ln>
+        </p:spPr>
+        <p:style>
+          <a:lnRef idx="2">
+            <a:schemeClr val="accent1">
+              <a:shade val="50000"/>
+            </a:schemeClr>
+          </a:lnRef>
+          <a:fillRef idx="1">
+            <a:schemeClr val="accent1"/>
+          </a:fillRef>
+          <a:effectRef idx="0">
+            <a:schemeClr val="accent1"/>
+          </a:effectRef>
+          <a:fontRef idx="minor">
+            <a:schemeClr val="lt1"/>
+          </a:fontRef>
+        </p:style>
+        <p:txBody>
+          <a:bodyPr rtlCol="0" anchor="ctr"/>
+          <a:lstStyle/>
+          <a:p>
+            <a:pPr algn="ctr"/>
+            <a:r>
+              <a:rPr lang="en-US" sz="1400" dirty="0">
+                <a:solidFill>
+                  <a:schemeClr val="tx1"/>
+                </a:solidFill>
+              </a:rPr>
+              <a:t>Data Factory (QA)</a:t>
+            </a:r>
+          </a:p>
+        </p:txBody>
+      </p:sp>
+      <p:sp>
+        <p:nvSpPr>
+          <p:cNvPr id="18" name="Rectangle 17">
+            <a:extLst>
+              <a:ext uri="{FF2B5EF4-FFF2-40B4-BE49-F238E27FC236}">
+                <a16:creationId xmlns:a16="http://schemas.microsoft.com/office/drawing/2014/main" id="{A472CE86-B6C6-4E4D-97B7-498602FDFCE0}"/>
+              </a:ext>
+            </a:extLst>
+          </p:cNvPr>
+          <p:cNvSpPr/>
+          <p:nvPr/>
+        </p:nvSpPr>
+        <p:spPr>
+          <a:xfrm>
+            <a:off x="8362924" y="1885516"/>
+            <a:ext cx="2048403" cy="284205"/>
+          </a:xfrm>
+          <a:prstGeom prst="rect">
+            <a:avLst/>
+          </a:prstGeom>
+          <a:solidFill>
+            <a:schemeClr val="bg1">
+              <a:lumMod val="85000"/>
+            </a:schemeClr>
+          </a:solidFill>
+          <a:ln>
+            <a:solidFill>
+              <a:schemeClr val="accent5">
+                <a:lumMod val="60000"/>
+                <a:lumOff val="40000"/>
+              </a:schemeClr>
+            </a:solidFill>
+          </a:ln>
+        </p:spPr>
+        <p:style>
+          <a:lnRef idx="2">
+            <a:schemeClr val="accent1">
+              <a:shade val="50000"/>
+            </a:schemeClr>
+          </a:lnRef>
+          <a:fillRef idx="1">
+            <a:schemeClr val="accent1"/>
+          </a:fillRef>
+          <a:effectRef idx="0">
+            <a:schemeClr val="accent1"/>
+          </a:effectRef>
+          <a:fontRef idx="minor">
+            <a:schemeClr val="lt1"/>
+          </a:fontRef>
+        </p:style>
+        <p:txBody>
+          <a:bodyPr rtlCol="0" anchor="ctr"/>
+          <a:lstStyle/>
+          <a:p>
+            <a:pPr algn="ctr"/>
+            <a:r>
+              <a:rPr lang="en-US" sz="1400" dirty="0">
+                <a:solidFill>
+                  <a:schemeClr val="tx1"/>
+                </a:solidFill>
+              </a:rPr>
+              <a:t>Data Factory (Prod)</a:t>
+            </a:r>
+          </a:p>
+        </p:txBody>
+      </p:sp>
+      <p:pic>
+        <p:nvPicPr>
+          <p:cNvPr id="2050" name="Picture 2" descr="See the source image">
+            <a:extLst>
+              <a:ext uri="{FF2B5EF4-FFF2-40B4-BE49-F238E27FC236}">
+                <a16:creationId xmlns:a16="http://schemas.microsoft.com/office/drawing/2014/main" id="{FE6FAB28-4A0C-4A3B-847E-E77EEE4625F0}"/>
+              </a:ext>
+            </a:extLst>
+          </p:cNvPr>
+          <p:cNvPicPr>
+            <a:picLocks noChangeAspect="1" noChangeArrowheads="1"/>
+          </p:cNvPicPr>
+          <p:nvPr/>
+        </p:nvPicPr>
+        <p:blipFill>
+          <a:blip r:embed="rId2">
+            <a:extLst>
+              <a:ext uri="{28A0092B-C50C-407E-A947-70E740481C1C}">
+                <a14:useLocalDpi xmlns:a14="http://schemas.microsoft.com/office/drawing/2010/main" val="0"/>
+              </a:ext>
+            </a:extLst>
+          </a:blip>
+          <a:srcRect/>
+          <a:stretch>
+            <a:fillRect/>
+          </a:stretch>
+        </p:blipFill>
+        <p:spPr bwMode="auto">
+          <a:xfrm>
+            <a:off x="1474355" y="2867274"/>
+            <a:ext cx="513347" cy="513347"/>
+          </a:xfrm>
+          <a:prstGeom prst="rect">
+            <a:avLst/>
+          </a:prstGeom>
+          <a:noFill/>
+          <a:extLst>
+            <a:ext uri="{909E8E84-426E-40DD-AFC4-6F175D3DCCD1}">
+              <a14:hiddenFill xmlns:a14="http://schemas.microsoft.com/office/drawing/2010/main">
+                <a:solidFill>
+                  <a:srgbClr val="FFFFFF"/>
+                </a:solidFill>
+              </a14:hiddenFill>
+            </a:ext>
+          </a:extLst>
+        </p:spPr>
+      </p:pic>
+      <p:cxnSp>
+        <p:nvCxnSpPr>
+          <p:cNvPr id="5" name="Straight Arrow Connector 4">
+            <a:extLst>
+              <a:ext uri="{FF2B5EF4-FFF2-40B4-BE49-F238E27FC236}">
+                <a16:creationId xmlns:a16="http://schemas.microsoft.com/office/drawing/2014/main" id="{573CE645-4E7A-400B-8AB0-D8F02E29FB40}"/>
+              </a:ext>
+            </a:extLst>
+          </p:cNvPr>
+          <p:cNvCxnSpPr>
+            <a:cxnSpLocks/>
+          </p:cNvCxnSpPr>
+          <p:nvPr/>
+        </p:nvCxnSpPr>
+        <p:spPr>
+          <a:xfrm>
+            <a:off x="4990158" y="1397014"/>
+            <a:ext cx="1476242" cy="0"/>
+          </a:xfrm>
+          <a:prstGeom prst="straightConnector1">
+            <a:avLst/>
+          </a:prstGeom>
+          <a:ln>
+            <a:tailEnd type="triangle"/>
+          </a:ln>
+        </p:spPr>
+        <p:style>
+          <a:lnRef idx="1">
+            <a:schemeClr val="accent1"/>
+          </a:lnRef>
+          <a:fillRef idx="0">
+            <a:schemeClr val="accent1"/>
+          </a:fillRef>
+          <a:effectRef idx="0">
+            <a:schemeClr val="accent1"/>
+          </a:effectRef>
+          <a:fontRef idx="minor">
+            <a:schemeClr val="tx1"/>
+          </a:fontRef>
+        </p:style>
+      </p:cxnSp>
+      <p:cxnSp>
+        <p:nvCxnSpPr>
+          <p:cNvPr id="7" name="Straight Arrow Connector 6">
+            <a:extLst>
+              <a:ext uri="{FF2B5EF4-FFF2-40B4-BE49-F238E27FC236}">
+                <a16:creationId xmlns:a16="http://schemas.microsoft.com/office/drawing/2014/main" id="{E0F651E1-B65E-4B47-96A5-4CFEF2618FD8}"/>
+              </a:ext>
+            </a:extLst>
+          </p:cNvPr>
+          <p:cNvCxnSpPr>
+            <a:cxnSpLocks/>
+          </p:cNvCxnSpPr>
+          <p:nvPr/>
+        </p:nvCxnSpPr>
+        <p:spPr>
+          <a:xfrm>
+            <a:off x="7385960" y="1397014"/>
+            <a:ext cx="1541385" cy="0"/>
+          </a:xfrm>
+          <a:prstGeom prst="straightConnector1">
+            <a:avLst/>
+          </a:prstGeom>
+          <a:ln>
+            <a:tailEnd type="triangle"/>
+          </a:ln>
+        </p:spPr>
+        <p:style>
+          <a:lnRef idx="1">
+            <a:schemeClr val="accent1"/>
+          </a:lnRef>
+          <a:fillRef idx="0">
+            <a:schemeClr val="accent1"/>
+          </a:fillRef>
+          <a:effectRef idx="0">
+            <a:schemeClr val="accent1"/>
+          </a:effectRef>
+          <a:fontRef idx="minor">
+            <a:schemeClr val="tx1"/>
+          </a:fontRef>
+        </p:style>
+      </p:cxnSp>
+      <p:cxnSp>
+        <p:nvCxnSpPr>
+          <p:cNvPr id="12" name="Straight Arrow Connector 11">
+            <a:extLst>
+              <a:ext uri="{FF2B5EF4-FFF2-40B4-BE49-F238E27FC236}">
+                <a16:creationId xmlns:a16="http://schemas.microsoft.com/office/drawing/2014/main" id="{0D00EB4E-8813-4FE7-B812-CED4233B336F}"/>
+              </a:ext>
+            </a:extLst>
+          </p:cNvPr>
+          <p:cNvCxnSpPr>
+            <a:stCxn id="9" idx="2"/>
+            <a:endCxn id="2050" idx="0"/>
+          </p:cNvCxnSpPr>
+          <p:nvPr/>
+        </p:nvCxnSpPr>
+        <p:spPr>
+          <a:xfrm flipH="1">
+            <a:off x="1731029" y="2169721"/>
+            <a:ext cx="2" cy="697553"/>
+          </a:xfrm>
+          <a:prstGeom prst="straightConnector1">
+            <a:avLst/>
+          </a:prstGeom>
+          <a:ln>
+            <a:tailEnd type="triangle"/>
+          </a:ln>
+        </p:spPr>
+        <p:style>
+          <a:lnRef idx="1">
+            <a:schemeClr val="accent1"/>
+          </a:lnRef>
+          <a:fillRef idx="0">
+            <a:schemeClr val="accent1"/>
+          </a:fillRef>
+          <a:effectRef idx="0">
+            <a:schemeClr val="accent1"/>
+          </a:effectRef>
+          <a:fontRef idx="minor">
+            <a:schemeClr val="tx1"/>
+          </a:fontRef>
+        </p:style>
+      </p:cxnSp>
+      <p:sp>
+        <p:nvSpPr>
+          <p:cNvPr id="17" name="TextBox 16">
+            <a:extLst>
+              <a:ext uri="{FF2B5EF4-FFF2-40B4-BE49-F238E27FC236}">
+                <a16:creationId xmlns:a16="http://schemas.microsoft.com/office/drawing/2014/main" id="{57D3E6D5-E43F-4376-8B5C-982E0F619D00}"/>
+              </a:ext>
+            </a:extLst>
+          </p:cNvPr>
+          <p:cNvSpPr txBox="1"/>
+          <p:nvPr/>
+        </p:nvSpPr>
+        <p:spPr>
+          <a:xfrm>
+            <a:off x="3503469" y="2785238"/>
+            <a:ext cx="8394898" cy="2954655"/>
+          </a:xfrm>
+          <a:prstGeom prst="rect">
+            <a:avLst/>
+          </a:prstGeom>
+          <a:noFill/>
+        </p:spPr>
+        <p:txBody>
+          <a:bodyPr wrap="square" rtlCol="0">
+            <a:spAutoFit/>
+          </a:bodyPr>
+          <a:lstStyle/>
+          <a:p>
+            <a:r>
+              <a:rPr lang="en-US" sz="1050" b="1" dirty="0"/>
+              <a:t>How this works:</a:t>
+            </a:r>
+          </a:p>
+          <a:p>
+            <a:pPr marL="342900" indent="-342900">
+              <a:buFont typeface="Arial" panose="020B0604020202020204" pitchFamily="34" charset="0"/>
+              <a:buChar char="•"/>
+            </a:pPr>
+            <a:r>
+              <a:rPr lang="en-US" sz="1100" dirty="0"/>
+              <a:t>Development work is done in a ADF workspace named “Work Area”</a:t>
+            </a:r>
+          </a:p>
+          <a:p>
+            <a:pPr marL="342900" indent="-342900">
+              <a:buFont typeface="Arial" panose="020B0604020202020204" pitchFamily="34" charset="0"/>
+              <a:buChar char="•"/>
+            </a:pPr>
+            <a:r>
+              <a:rPr lang="en-US" sz="1100" dirty="0"/>
+              <a:t>The “Work Area” workspace is the only workspace tied to source control</a:t>
+            </a:r>
+          </a:p>
+          <a:p>
+            <a:pPr marL="342900" indent="-342900">
+              <a:buFont typeface="Arial" panose="020B0604020202020204" pitchFamily="34" charset="0"/>
+              <a:buChar char="•"/>
+            </a:pPr>
+            <a:r>
+              <a:rPr lang="en-US" sz="1100" dirty="0"/>
+              <a:t>Dev/ QA / Prod are never used for development (they are “read-only”)</a:t>
+            </a:r>
+          </a:p>
+          <a:p>
+            <a:pPr marL="342900" indent="-342900">
+              <a:buFont typeface="Arial" panose="020B0604020202020204" pitchFamily="34" charset="0"/>
+              <a:buChar char="•"/>
+            </a:pPr>
+            <a:r>
+              <a:rPr lang="en-US" sz="1100" dirty="0"/>
+              <a:t>The reason for a “Dev” workspace versus doing your development directly in Dev is so you can exercise your DevOps pipeline.</a:t>
+            </a:r>
+          </a:p>
+          <a:p>
+            <a:pPr marL="342900" indent="-342900">
+              <a:buFont typeface="Arial" panose="020B0604020202020204" pitchFamily="34" charset="0"/>
+              <a:buChar char="•"/>
+            </a:pPr>
+            <a:r>
+              <a:rPr lang="en-US" sz="1100" dirty="0"/>
+              <a:t>Your DevOps pipeline will</a:t>
+            </a:r>
+          </a:p>
+          <a:p>
+            <a:pPr marL="800100" lvl="1" indent="-342900">
+              <a:buFont typeface="Arial" panose="020B0604020202020204" pitchFamily="34" charset="0"/>
+              <a:buChar char="•"/>
+            </a:pPr>
+            <a:r>
+              <a:rPr lang="en-US" sz="1100" dirty="0"/>
+              <a:t>Build “Stage”</a:t>
+            </a:r>
+          </a:p>
+          <a:p>
+            <a:pPr marL="1257300" lvl="2" indent="-342900">
+              <a:buFont typeface="Arial" panose="020B0604020202020204" pitchFamily="34" charset="0"/>
+              <a:buChar char="•"/>
+            </a:pPr>
+            <a:r>
+              <a:rPr lang="en-US" sz="1100" dirty="0"/>
+              <a:t>Copy the ADF Publish Files as an Artifact (this is in a different branch)</a:t>
+            </a:r>
+          </a:p>
+          <a:p>
+            <a:pPr marL="1257300" lvl="2" indent="-342900">
+              <a:buFont typeface="Arial" panose="020B0604020202020204" pitchFamily="34" charset="0"/>
+              <a:buChar char="•"/>
+            </a:pPr>
+            <a:r>
+              <a:rPr lang="en-US" sz="1100" dirty="0"/>
+              <a:t>Package up your code/files into artifacts</a:t>
+            </a:r>
+          </a:p>
+          <a:p>
+            <a:pPr marL="800100" lvl="1" indent="-342900">
+              <a:buFont typeface="Arial" panose="020B0604020202020204" pitchFamily="34" charset="0"/>
+              <a:buChar char="•"/>
+            </a:pPr>
+            <a:r>
+              <a:rPr lang="en-US" sz="1100" dirty="0"/>
+              <a:t>Deploy Stages (Dev -&gt; QA -&gt; Prod)</a:t>
+            </a:r>
+          </a:p>
+          <a:p>
+            <a:pPr marL="1257300" lvl="2" indent="-342900">
+              <a:buFont typeface="Arial" panose="020B0604020202020204" pitchFamily="34" charset="0"/>
+              <a:buChar char="•"/>
+            </a:pPr>
+            <a:r>
+              <a:rPr lang="en-US" sz="1100" dirty="0"/>
+              <a:t>Create the ADF (Azure  Resource) via ARM template</a:t>
+            </a:r>
+          </a:p>
+          <a:p>
+            <a:pPr marL="1257300" lvl="2" indent="-342900">
+              <a:buFont typeface="Arial" panose="020B0604020202020204" pitchFamily="34" charset="0"/>
+              <a:buChar char="•"/>
+            </a:pPr>
+            <a:r>
+              <a:rPr lang="en-US" sz="1100" dirty="0"/>
+              <a:t>Stop ADF triggers</a:t>
+            </a:r>
+          </a:p>
+          <a:p>
+            <a:pPr marL="1257300" lvl="2" indent="-342900">
+              <a:buFont typeface="Arial" panose="020B0604020202020204" pitchFamily="34" charset="0"/>
+              <a:buChar char="•"/>
+            </a:pPr>
+            <a:r>
+              <a:rPr lang="en-US" sz="1100" dirty="0"/>
+              <a:t>Deploy ADF (Pipelines) via published ARM template</a:t>
+            </a:r>
+          </a:p>
+          <a:p>
+            <a:pPr marL="1257300" lvl="2" indent="-342900">
+              <a:buFont typeface="Arial" panose="020B0604020202020204" pitchFamily="34" charset="0"/>
+              <a:buChar char="•"/>
+            </a:pPr>
+            <a:r>
+              <a:rPr lang="en-US" sz="1100" dirty="0"/>
+              <a:t>Enable triggers</a:t>
+            </a:r>
+          </a:p>
+          <a:p>
+            <a:r>
+              <a:rPr lang="en-US" sz="1050" b="1" dirty="0"/>
+              <a:t>Notes</a:t>
+            </a:r>
+          </a:p>
+          <a:p>
+            <a:pPr marL="171450" indent="-171450">
+              <a:buFont typeface="Arial" panose="020B0604020202020204" pitchFamily="34" charset="0"/>
+              <a:buChar char="•"/>
+            </a:pPr>
+            <a:r>
+              <a:rPr lang="en-US" sz="1100" dirty="0"/>
+              <a:t>Dev, QA and Prod can be in different subscriptions.  You will need to create additional service connections.  The above sample deploys in a single subscription to different resource groups.</a:t>
+            </a:r>
+          </a:p>
+        </p:txBody>
+      </p:sp>
+      <p:cxnSp>
+        <p:nvCxnSpPr>
+          <p:cNvPr id="22" name="Connector: Elbow 21">
+            <a:extLst>
+              <a:ext uri="{FF2B5EF4-FFF2-40B4-BE49-F238E27FC236}">
+                <a16:creationId xmlns:a16="http://schemas.microsoft.com/office/drawing/2014/main" id="{3B1FACA2-A7C8-4261-8849-45406F410A87}"/>
+              </a:ext>
+            </a:extLst>
+          </p:cNvPr>
+          <p:cNvCxnSpPr>
+            <a:cxnSpLocks/>
+            <a:stCxn id="2050" idx="3"/>
+            <a:endCxn id="59" idx="1"/>
+          </p:cNvCxnSpPr>
+          <p:nvPr/>
+        </p:nvCxnSpPr>
+        <p:spPr>
+          <a:xfrm flipV="1">
+            <a:off x="1987702" y="1397014"/>
+            <a:ext cx="2080343" cy="1726934"/>
+          </a:xfrm>
+          <a:prstGeom prst="bentConnector3">
+            <a:avLst>
+              <a:gd name="adj1" fmla="val 50000"/>
+            </a:avLst>
+          </a:prstGeom>
+          <a:ln>
+            <a:tailEnd type="triangle"/>
+          </a:ln>
+        </p:spPr>
+        <p:style>
+          <a:lnRef idx="1">
+            <a:schemeClr val="accent1"/>
+          </a:lnRef>
+          <a:fillRef idx="0">
+            <a:schemeClr val="accent1"/>
+          </a:fillRef>
+          <a:effectRef idx="0">
+            <a:schemeClr val="accent1"/>
+          </a:effectRef>
+          <a:fontRef idx="minor">
+            <a:schemeClr val="tx1"/>
+          </a:fontRef>
+        </p:style>
+      </p:cxnSp>
+      <p:grpSp>
+        <p:nvGrpSpPr>
+          <p:cNvPr id="28" name="Group 27">
+            <a:extLst>
+              <a:ext uri="{FF2B5EF4-FFF2-40B4-BE49-F238E27FC236}">
+                <a16:creationId xmlns:a16="http://schemas.microsoft.com/office/drawing/2014/main" id="{AB4906EE-4249-4EDF-B96A-5E7D576618B6}"/>
+              </a:ext>
+            </a:extLst>
+          </p:cNvPr>
+          <p:cNvGrpSpPr/>
+          <p:nvPr/>
+        </p:nvGrpSpPr>
+        <p:grpSpPr>
+          <a:xfrm>
+            <a:off x="1987702" y="3498174"/>
+            <a:ext cx="1327775" cy="261610"/>
+            <a:chOff x="4345815" y="2302983"/>
+            <a:chExt cx="1327775" cy="261610"/>
+          </a:xfrm>
+        </p:grpSpPr>
+        <p:pic>
+          <p:nvPicPr>
+            <p:cNvPr id="29" name="Picture 2" descr="See the source image">
+              <a:extLst>
+                <a:ext uri="{FF2B5EF4-FFF2-40B4-BE49-F238E27FC236}">
+                  <a16:creationId xmlns:a16="http://schemas.microsoft.com/office/drawing/2014/main" id="{072CE1DA-7332-407D-B0E4-F7482204C43F}"/>
+                </a:ext>
+              </a:extLst>
+            </p:cNvPr>
+            <p:cNvPicPr>
+              <a:picLocks noChangeAspect="1" noChangeArrowheads="1"/>
+            </p:cNvPicPr>
+            <p:nvPr/>
+          </p:nvPicPr>
+          <p:blipFill>
+            <a:blip r:embed="rId3">
+              <a:extLst>
+                <a:ext uri="{28A0092B-C50C-407E-A947-70E740481C1C}">
+                  <a14:useLocalDpi xmlns:a14="http://schemas.microsoft.com/office/drawing/2010/main" val="0"/>
+                </a:ext>
+              </a:extLst>
+            </a:blip>
+            <a:srcRect/>
+            <a:stretch>
+              <a:fillRect/>
+            </a:stretch>
+          </p:blipFill>
+          <p:spPr bwMode="auto">
+            <a:xfrm>
+              <a:off x="4345815" y="2315884"/>
+              <a:ext cx="235809" cy="235809"/>
+            </a:xfrm>
+            <a:prstGeom prst="rect">
+              <a:avLst/>
+            </a:prstGeom>
+            <a:noFill/>
+            <a:extLst>
+              <a:ext uri="{909E8E84-426E-40DD-AFC4-6F175D3DCCD1}">
+                <a14:hiddenFill xmlns:a14="http://schemas.microsoft.com/office/drawing/2010/main">
+                  <a:solidFill>
+                    <a:srgbClr val="FFFFFF"/>
+                  </a:solidFill>
+                </a14:hiddenFill>
+              </a:ext>
+            </a:extLst>
+          </p:spPr>
+        </p:pic>
+        <p:sp>
+          <p:nvSpPr>
+            <p:cNvPr id="30" name="TextBox 29">
+              <a:extLst>
+                <a:ext uri="{FF2B5EF4-FFF2-40B4-BE49-F238E27FC236}">
+                  <a16:creationId xmlns:a16="http://schemas.microsoft.com/office/drawing/2014/main" id="{C5D9D2A1-2CEC-4361-A036-7459B65D2777}"/>
+                </a:ext>
+              </a:extLst>
+            </p:cNvPr>
+            <p:cNvSpPr txBox="1"/>
+            <p:nvPr/>
+          </p:nvSpPr>
+          <p:spPr>
+            <a:xfrm>
+              <a:off x="4581624" y="2302983"/>
+              <a:ext cx="1091966" cy="261610"/>
+            </a:xfrm>
+            <a:prstGeom prst="rect">
+              <a:avLst/>
+            </a:prstGeom>
+            <a:noFill/>
+          </p:spPr>
+          <p:txBody>
+            <a:bodyPr wrap="none" rtlCol="0">
+              <a:spAutoFit/>
+            </a:bodyPr>
+            <a:lstStyle/>
+            <a:p>
+              <a:r>
+                <a:rPr lang="en-US" sz="1100" dirty="0"/>
+                <a:t>ARM Templates</a:t>
+              </a:r>
+            </a:p>
+          </p:txBody>
+        </p:sp>
+      </p:grpSp>
+      <p:cxnSp>
+        <p:nvCxnSpPr>
+          <p:cNvPr id="31" name="Connector: Elbow 30">
+            <a:extLst>
+              <a:ext uri="{FF2B5EF4-FFF2-40B4-BE49-F238E27FC236}">
+                <a16:creationId xmlns:a16="http://schemas.microsoft.com/office/drawing/2014/main" id="{B5EEFBAA-B08A-45FD-8A3E-21D0DC251E65}"/>
+              </a:ext>
+            </a:extLst>
+          </p:cNvPr>
+          <p:cNvCxnSpPr>
+            <a:stCxn id="29" idx="1"/>
+          </p:cNvCxnSpPr>
+          <p:nvPr/>
+        </p:nvCxnSpPr>
+        <p:spPr>
+          <a:xfrm rot="10800000">
+            <a:off x="1735066" y="3421070"/>
+            <a:ext cx="252637" cy="207911"/>
+          </a:xfrm>
+          <a:prstGeom prst="bentConnector2">
+            <a:avLst/>
+          </a:prstGeom>
+        </p:spPr>
+        <p:style>
+          <a:lnRef idx="1">
+            <a:schemeClr val="accent1"/>
+          </a:lnRef>
+          <a:fillRef idx="0">
+            <a:schemeClr val="accent1"/>
+          </a:fillRef>
+          <a:effectRef idx="0">
+            <a:schemeClr val="accent1"/>
+          </a:effectRef>
+          <a:fontRef idx="minor">
+            <a:schemeClr val="tx1"/>
+          </a:fontRef>
+        </p:style>
+      </p:cxnSp>
+      <p:grpSp>
+        <p:nvGrpSpPr>
+          <p:cNvPr id="32" name="Group 31">
+            <a:extLst>
+              <a:ext uri="{FF2B5EF4-FFF2-40B4-BE49-F238E27FC236}">
+                <a16:creationId xmlns:a16="http://schemas.microsoft.com/office/drawing/2014/main" id="{48078B37-EC75-4662-80C3-4AB8AA4343CF}"/>
+              </a:ext>
+            </a:extLst>
+          </p:cNvPr>
+          <p:cNvGrpSpPr/>
+          <p:nvPr/>
+        </p:nvGrpSpPr>
+        <p:grpSpPr>
+          <a:xfrm>
+            <a:off x="1987702" y="3712970"/>
+            <a:ext cx="846874" cy="261610"/>
+            <a:chOff x="4345815" y="2302983"/>
+            <a:chExt cx="846874" cy="261610"/>
+          </a:xfrm>
+        </p:grpSpPr>
+        <p:pic>
+          <p:nvPicPr>
+            <p:cNvPr id="34" name="Picture 2" descr="See the source image">
+              <a:extLst>
+                <a:ext uri="{FF2B5EF4-FFF2-40B4-BE49-F238E27FC236}">
+                  <a16:creationId xmlns:a16="http://schemas.microsoft.com/office/drawing/2014/main" id="{BC35923A-F66D-4963-A576-F6F66602C623}"/>
+                </a:ext>
+              </a:extLst>
+            </p:cNvPr>
+            <p:cNvPicPr>
+              <a:picLocks noChangeAspect="1" noChangeArrowheads="1"/>
+            </p:cNvPicPr>
+            <p:nvPr/>
+          </p:nvPicPr>
+          <p:blipFill>
+            <a:blip r:embed="rId3">
+              <a:extLst>
+                <a:ext uri="{28A0092B-C50C-407E-A947-70E740481C1C}">
+                  <a14:useLocalDpi xmlns:a14="http://schemas.microsoft.com/office/drawing/2010/main" val="0"/>
+                </a:ext>
+              </a:extLst>
+            </a:blip>
+            <a:srcRect/>
+            <a:stretch>
+              <a:fillRect/>
+            </a:stretch>
+          </p:blipFill>
+          <p:spPr bwMode="auto">
+            <a:xfrm>
+              <a:off x="4345815" y="2315884"/>
+              <a:ext cx="235809" cy="235809"/>
+            </a:xfrm>
+            <a:prstGeom prst="rect">
+              <a:avLst/>
+            </a:prstGeom>
+            <a:noFill/>
+            <a:extLst>
+              <a:ext uri="{909E8E84-426E-40DD-AFC4-6F175D3DCCD1}">
+                <a14:hiddenFill xmlns:a14="http://schemas.microsoft.com/office/drawing/2010/main">
+                  <a:solidFill>
+                    <a:srgbClr val="FFFFFF"/>
+                  </a:solidFill>
+                </a14:hiddenFill>
+              </a:ext>
+            </a:extLst>
+          </p:spPr>
+        </p:pic>
+        <p:sp>
+          <p:nvSpPr>
+            <p:cNvPr id="36" name="TextBox 35">
+              <a:extLst>
+                <a:ext uri="{FF2B5EF4-FFF2-40B4-BE49-F238E27FC236}">
+                  <a16:creationId xmlns:a16="http://schemas.microsoft.com/office/drawing/2014/main" id="{597E20F7-11DE-4674-B7C7-A603ACBB203D}"/>
+                </a:ext>
+              </a:extLst>
+            </p:cNvPr>
+            <p:cNvSpPr txBox="1"/>
+            <p:nvPr/>
+          </p:nvSpPr>
+          <p:spPr>
+            <a:xfrm>
+              <a:off x="4581624" y="2302983"/>
+              <a:ext cx="611065" cy="261610"/>
+            </a:xfrm>
+            <a:prstGeom prst="rect">
+              <a:avLst/>
+            </a:prstGeom>
+            <a:noFill/>
+          </p:spPr>
+          <p:txBody>
+            <a:bodyPr wrap="none" rtlCol="0">
+              <a:spAutoFit/>
+            </a:bodyPr>
+            <a:lstStyle/>
+            <a:p>
+              <a:r>
+                <a:rPr lang="en-US" sz="1100" dirty="0"/>
+                <a:t>dataset</a:t>
+              </a:r>
+            </a:p>
+          </p:txBody>
+        </p:sp>
+      </p:grpSp>
+      <p:cxnSp>
+        <p:nvCxnSpPr>
+          <p:cNvPr id="37" name="Connector: Elbow 36">
+            <a:extLst>
+              <a:ext uri="{FF2B5EF4-FFF2-40B4-BE49-F238E27FC236}">
+                <a16:creationId xmlns:a16="http://schemas.microsoft.com/office/drawing/2014/main" id="{6F751A8D-B5AB-4BC6-BCED-EFCB167FF19C}"/>
+              </a:ext>
+            </a:extLst>
+          </p:cNvPr>
+          <p:cNvCxnSpPr>
+            <a:stCxn id="34" idx="1"/>
+          </p:cNvCxnSpPr>
+          <p:nvPr/>
+        </p:nvCxnSpPr>
+        <p:spPr>
+          <a:xfrm rot="10800000">
+            <a:off x="1735066" y="3635866"/>
+            <a:ext cx="252637" cy="207911"/>
+          </a:xfrm>
+          <a:prstGeom prst="bentConnector2">
+            <a:avLst/>
+          </a:prstGeom>
+        </p:spPr>
+        <p:style>
+          <a:lnRef idx="1">
+            <a:schemeClr val="accent1"/>
+          </a:lnRef>
+          <a:fillRef idx="0">
+            <a:schemeClr val="accent1"/>
+          </a:fillRef>
+          <a:effectRef idx="0">
+            <a:schemeClr val="accent1"/>
+          </a:effectRef>
+          <a:fontRef idx="minor">
+            <a:schemeClr val="tx1"/>
+          </a:fontRef>
+        </p:style>
+      </p:cxnSp>
+      <p:grpSp>
+        <p:nvGrpSpPr>
+          <p:cNvPr id="42" name="Group 41">
+            <a:extLst>
+              <a:ext uri="{FF2B5EF4-FFF2-40B4-BE49-F238E27FC236}">
+                <a16:creationId xmlns:a16="http://schemas.microsoft.com/office/drawing/2014/main" id="{ECE098E0-9DC1-4217-B1FE-EA7ABB7B23AE}"/>
+              </a:ext>
+            </a:extLst>
+          </p:cNvPr>
+          <p:cNvGrpSpPr/>
+          <p:nvPr/>
+        </p:nvGrpSpPr>
+        <p:grpSpPr>
+          <a:xfrm>
+            <a:off x="1987540" y="3925446"/>
+            <a:ext cx="1177092" cy="261610"/>
+            <a:chOff x="4345815" y="2302983"/>
+            <a:chExt cx="1177092" cy="261610"/>
+          </a:xfrm>
+        </p:grpSpPr>
+        <p:pic>
+          <p:nvPicPr>
+            <p:cNvPr id="43" name="Picture 2" descr="See the source image">
+              <a:extLst>
+                <a:ext uri="{FF2B5EF4-FFF2-40B4-BE49-F238E27FC236}">
+                  <a16:creationId xmlns:a16="http://schemas.microsoft.com/office/drawing/2014/main" id="{D0E4787E-A064-435C-BDAC-8FF65BC92B8D}"/>
+                </a:ext>
+              </a:extLst>
+            </p:cNvPr>
+            <p:cNvPicPr>
+              <a:picLocks noChangeAspect="1" noChangeArrowheads="1"/>
+            </p:cNvPicPr>
+            <p:nvPr/>
+          </p:nvPicPr>
+          <p:blipFill>
+            <a:blip r:embed="rId3">
+              <a:extLst>
+                <a:ext uri="{28A0092B-C50C-407E-A947-70E740481C1C}">
+                  <a14:useLocalDpi xmlns:a14="http://schemas.microsoft.com/office/drawing/2010/main" val="0"/>
+                </a:ext>
+              </a:extLst>
+            </a:blip>
+            <a:srcRect/>
+            <a:stretch>
+              <a:fillRect/>
+            </a:stretch>
+          </p:blipFill>
+          <p:spPr bwMode="auto">
+            <a:xfrm>
+              <a:off x="4345815" y="2315884"/>
+              <a:ext cx="235809" cy="235809"/>
+            </a:xfrm>
+            <a:prstGeom prst="rect">
+              <a:avLst/>
+            </a:prstGeom>
+            <a:noFill/>
+            <a:extLst>
+              <a:ext uri="{909E8E84-426E-40DD-AFC4-6F175D3DCCD1}">
+                <a14:hiddenFill xmlns:a14="http://schemas.microsoft.com/office/drawing/2010/main">
+                  <a:solidFill>
+                    <a:srgbClr val="FFFFFF"/>
+                  </a:solidFill>
+                </a14:hiddenFill>
+              </a:ext>
+            </a:extLst>
+          </p:spPr>
+        </p:pic>
+        <p:sp>
+          <p:nvSpPr>
+            <p:cNvPr id="44" name="TextBox 43">
+              <a:extLst>
+                <a:ext uri="{FF2B5EF4-FFF2-40B4-BE49-F238E27FC236}">
+                  <a16:creationId xmlns:a16="http://schemas.microsoft.com/office/drawing/2014/main" id="{C833CBD5-6EF9-4A59-BA94-32FBE6C36E4B}"/>
+                </a:ext>
+              </a:extLst>
+            </p:cNvPr>
+            <p:cNvSpPr txBox="1"/>
+            <p:nvPr/>
+          </p:nvSpPr>
+          <p:spPr>
+            <a:xfrm>
+              <a:off x="4581624" y="2302983"/>
+              <a:ext cx="941283" cy="261610"/>
+            </a:xfrm>
+            <a:prstGeom prst="rect">
+              <a:avLst/>
+            </a:prstGeom>
+            <a:noFill/>
+          </p:spPr>
+          <p:txBody>
+            <a:bodyPr wrap="none" rtlCol="0">
+              <a:spAutoFit/>
+            </a:bodyPr>
+            <a:lstStyle/>
+            <a:p>
+              <a:r>
+                <a:rPr lang="en-US" sz="1100" dirty="0" err="1"/>
+                <a:t>linkedService</a:t>
+              </a:r>
+              <a:endParaRPr lang="en-US" sz="1100" dirty="0"/>
+            </a:p>
+          </p:txBody>
+        </p:sp>
+      </p:grpSp>
+      <p:cxnSp>
+        <p:nvCxnSpPr>
+          <p:cNvPr id="45" name="Connector: Elbow 44">
+            <a:extLst>
+              <a:ext uri="{FF2B5EF4-FFF2-40B4-BE49-F238E27FC236}">
+                <a16:creationId xmlns:a16="http://schemas.microsoft.com/office/drawing/2014/main" id="{12FB5817-BACF-4D94-9FB0-39E5B23D9275}"/>
+              </a:ext>
+            </a:extLst>
+          </p:cNvPr>
+          <p:cNvCxnSpPr>
+            <a:stCxn id="43" idx="1"/>
+          </p:cNvCxnSpPr>
+          <p:nvPr/>
+        </p:nvCxnSpPr>
+        <p:spPr>
+          <a:xfrm rot="10800000">
+            <a:off x="1734904" y="3848342"/>
+            <a:ext cx="252637" cy="207911"/>
+          </a:xfrm>
+          <a:prstGeom prst="bentConnector2">
+            <a:avLst/>
+          </a:prstGeom>
+        </p:spPr>
+        <p:style>
+          <a:lnRef idx="1">
+            <a:schemeClr val="accent1"/>
+          </a:lnRef>
+          <a:fillRef idx="0">
+            <a:schemeClr val="accent1"/>
+          </a:fillRef>
+          <a:effectRef idx="0">
+            <a:schemeClr val="accent1"/>
+          </a:effectRef>
+          <a:fontRef idx="minor">
+            <a:schemeClr val="tx1"/>
+          </a:fontRef>
+        </p:style>
+      </p:cxnSp>
+      <p:grpSp>
+        <p:nvGrpSpPr>
+          <p:cNvPr id="46" name="Group 45">
+            <a:extLst>
+              <a:ext uri="{FF2B5EF4-FFF2-40B4-BE49-F238E27FC236}">
+                <a16:creationId xmlns:a16="http://schemas.microsoft.com/office/drawing/2014/main" id="{8636D7F2-E801-47D2-9956-8AD746270C6F}"/>
+              </a:ext>
+            </a:extLst>
+          </p:cNvPr>
+          <p:cNvGrpSpPr/>
+          <p:nvPr/>
+        </p:nvGrpSpPr>
+        <p:grpSpPr>
+          <a:xfrm>
+            <a:off x="1987540" y="4138793"/>
+            <a:ext cx="878934" cy="261610"/>
+            <a:chOff x="4345815" y="2302983"/>
+            <a:chExt cx="878934" cy="261610"/>
+          </a:xfrm>
+        </p:grpSpPr>
+        <p:pic>
+          <p:nvPicPr>
+            <p:cNvPr id="47" name="Picture 2" descr="See the source image">
+              <a:extLst>
+                <a:ext uri="{FF2B5EF4-FFF2-40B4-BE49-F238E27FC236}">
+                  <a16:creationId xmlns:a16="http://schemas.microsoft.com/office/drawing/2014/main" id="{653FE033-7F5B-4FDD-AC17-E00101F5AD6F}"/>
+                </a:ext>
+              </a:extLst>
+            </p:cNvPr>
+            <p:cNvPicPr>
+              <a:picLocks noChangeAspect="1" noChangeArrowheads="1"/>
+            </p:cNvPicPr>
+            <p:nvPr/>
+          </p:nvPicPr>
+          <p:blipFill>
+            <a:blip r:embed="rId3">
+              <a:extLst>
+                <a:ext uri="{28A0092B-C50C-407E-A947-70E740481C1C}">
+                  <a14:useLocalDpi xmlns:a14="http://schemas.microsoft.com/office/drawing/2010/main" val="0"/>
+                </a:ext>
+              </a:extLst>
+            </a:blip>
+            <a:srcRect/>
+            <a:stretch>
+              <a:fillRect/>
+            </a:stretch>
+          </p:blipFill>
+          <p:spPr bwMode="auto">
+            <a:xfrm>
+              <a:off x="4345815" y="2315884"/>
+              <a:ext cx="235809" cy="235809"/>
+            </a:xfrm>
+            <a:prstGeom prst="rect">
+              <a:avLst/>
+            </a:prstGeom>
+            <a:noFill/>
+            <a:extLst>
+              <a:ext uri="{909E8E84-426E-40DD-AFC4-6F175D3DCCD1}">
+                <a14:hiddenFill xmlns:a14="http://schemas.microsoft.com/office/drawing/2010/main">
+                  <a:solidFill>
+                    <a:srgbClr val="FFFFFF"/>
+                  </a:solidFill>
+                </a14:hiddenFill>
+              </a:ext>
+            </a:extLst>
+          </p:spPr>
+        </p:pic>
+        <p:sp>
+          <p:nvSpPr>
+            <p:cNvPr id="48" name="TextBox 47">
+              <a:extLst>
+                <a:ext uri="{FF2B5EF4-FFF2-40B4-BE49-F238E27FC236}">
+                  <a16:creationId xmlns:a16="http://schemas.microsoft.com/office/drawing/2014/main" id="{549CB3A3-DBF3-499D-A30B-E9989769B423}"/>
+                </a:ext>
+              </a:extLst>
+            </p:cNvPr>
+            <p:cNvSpPr txBox="1"/>
+            <p:nvPr/>
+          </p:nvSpPr>
+          <p:spPr>
+            <a:xfrm>
+              <a:off x="4581624" y="2302983"/>
+              <a:ext cx="643125" cy="261610"/>
+            </a:xfrm>
+            <a:prstGeom prst="rect">
+              <a:avLst/>
+            </a:prstGeom>
+            <a:noFill/>
+          </p:spPr>
+          <p:txBody>
+            <a:bodyPr wrap="none" rtlCol="0">
+              <a:spAutoFit/>
+            </a:bodyPr>
+            <a:lstStyle/>
+            <a:p>
+              <a:r>
+                <a:rPr lang="en-US" sz="1100" dirty="0"/>
+                <a:t>pipeline</a:t>
+              </a:r>
+            </a:p>
+          </p:txBody>
+        </p:sp>
+      </p:grpSp>
+      <p:cxnSp>
+        <p:nvCxnSpPr>
+          <p:cNvPr id="49" name="Connector: Elbow 48">
+            <a:extLst>
+              <a:ext uri="{FF2B5EF4-FFF2-40B4-BE49-F238E27FC236}">
+                <a16:creationId xmlns:a16="http://schemas.microsoft.com/office/drawing/2014/main" id="{21CB2811-CA60-44E2-B396-7F9D2A172272}"/>
+              </a:ext>
+            </a:extLst>
+          </p:cNvPr>
+          <p:cNvCxnSpPr>
+            <a:stCxn id="47" idx="1"/>
+          </p:cNvCxnSpPr>
+          <p:nvPr/>
+        </p:nvCxnSpPr>
+        <p:spPr>
+          <a:xfrm rot="10800000">
+            <a:off x="1734904" y="4061689"/>
+            <a:ext cx="252637" cy="207911"/>
+          </a:xfrm>
+          <a:prstGeom prst="bentConnector2">
+            <a:avLst/>
+          </a:prstGeom>
+        </p:spPr>
+        <p:style>
+          <a:lnRef idx="1">
+            <a:schemeClr val="accent1"/>
+          </a:lnRef>
+          <a:fillRef idx="0">
+            <a:schemeClr val="accent1"/>
+          </a:fillRef>
+          <a:effectRef idx="0">
+            <a:schemeClr val="accent1"/>
+          </a:effectRef>
+          <a:fontRef idx="minor">
+            <a:schemeClr val="tx1"/>
+          </a:fontRef>
+        </p:style>
+      </p:cxnSp>
+      <p:grpSp>
+        <p:nvGrpSpPr>
+          <p:cNvPr id="54" name="Group 53">
+            <a:extLst>
+              <a:ext uri="{FF2B5EF4-FFF2-40B4-BE49-F238E27FC236}">
+                <a16:creationId xmlns:a16="http://schemas.microsoft.com/office/drawing/2014/main" id="{820AB2A6-2B89-4BB8-B6FB-FA4B069CF9D4}"/>
+              </a:ext>
+            </a:extLst>
+          </p:cNvPr>
+          <p:cNvGrpSpPr/>
+          <p:nvPr/>
+        </p:nvGrpSpPr>
+        <p:grpSpPr>
+          <a:xfrm>
+            <a:off x="1986787" y="4349783"/>
+            <a:ext cx="632071" cy="261610"/>
+            <a:chOff x="4345815" y="2302983"/>
+            <a:chExt cx="632071" cy="261610"/>
+          </a:xfrm>
+        </p:grpSpPr>
+        <p:pic>
+          <p:nvPicPr>
+            <p:cNvPr id="55" name="Picture 2" descr="See the source image">
+              <a:extLst>
+                <a:ext uri="{FF2B5EF4-FFF2-40B4-BE49-F238E27FC236}">
+                  <a16:creationId xmlns:a16="http://schemas.microsoft.com/office/drawing/2014/main" id="{34565703-EF3F-4EDC-B76E-DFA6CD6C875E}"/>
+                </a:ext>
+              </a:extLst>
+            </p:cNvPr>
+            <p:cNvPicPr>
+              <a:picLocks noChangeAspect="1" noChangeArrowheads="1"/>
+            </p:cNvPicPr>
+            <p:nvPr/>
+          </p:nvPicPr>
+          <p:blipFill>
+            <a:blip r:embed="rId3">
+              <a:extLst>
+                <a:ext uri="{28A0092B-C50C-407E-A947-70E740481C1C}">
+                  <a14:useLocalDpi xmlns:a14="http://schemas.microsoft.com/office/drawing/2010/main" val="0"/>
+                </a:ext>
+              </a:extLst>
+            </a:blip>
+            <a:srcRect/>
+            <a:stretch>
+              <a:fillRect/>
+            </a:stretch>
+          </p:blipFill>
+          <p:spPr bwMode="auto">
+            <a:xfrm>
+              <a:off x="4345815" y="2315884"/>
+              <a:ext cx="235809" cy="235809"/>
+            </a:xfrm>
+            <a:prstGeom prst="rect">
+              <a:avLst/>
+            </a:prstGeom>
+            <a:noFill/>
+            <a:extLst>
+              <a:ext uri="{909E8E84-426E-40DD-AFC4-6F175D3DCCD1}">
+                <a14:hiddenFill xmlns:a14="http://schemas.microsoft.com/office/drawing/2010/main">
+                  <a:solidFill>
+                    <a:srgbClr val="FFFFFF"/>
+                  </a:solidFill>
+                </a14:hiddenFill>
+              </a:ext>
+            </a:extLst>
+          </p:spPr>
+        </p:pic>
+        <p:sp>
+          <p:nvSpPr>
+            <p:cNvPr id="56" name="TextBox 55">
+              <a:extLst>
+                <a:ext uri="{FF2B5EF4-FFF2-40B4-BE49-F238E27FC236}">
+                  <a16:creationId xmlns:a16="http://schemas.microsoft.com/office/drawing/2014/main" id="{8575417E-18F0-4EE3-9EDB-842EA24E90AE}"/>
+                </a:ext>
+              </a:extLst>
+            </p:cNvPr>
+            <p:cNvSpPr txBox="1"/>
+            <p:nvPr/>
+          </p:nvSpPr>
+          <p:spPr>
+            <a:xfrm>
+              <a:off x="4581624" y="2302983"/>
+              <a:ext cx="396262" cy="261610"/>
+            </a:xfrm>
+            <a:prstGeom prst="rect">
+              <a:avLst/>
+            </a:prstGeom>
+            <a:noFill/>
+          </p:spPr>
+          <p:txBody>
+            <a:bodyPr wrap="none" rtlCol="0">
+              <a:spAutoFit/>
+            </a:bodyPr>
+            <a:lstStyle/>
+            <a:p>
+              <a:r>
+                <a:rPr lang="en-US" sz="1100" dirty="0"/>
+                <a:t>Etc.</a:t>
+              </a:r>
+            </a:p>
+          </p:txBody>
+        </p:sp>
+      </p:grpSp>
+      <p:cxnSp>
+        <p:nvCxnSpPr>
+          <p:cNvPr id="57" name="Connector: Elbow 56">
+            <a:extLst>
+              <a:ext uri="{FF2B5EF4-FFF2-40B4-BE49-F238E27FC236}">
+                <a16:creationId xmlns:a16="http://schemas.microsoft.com/office/drawing/2014/main" id="{0889D3A1-402B-401F-9F27-01F9F18B00EB}"/>
+              </a:ext>
+            </a:extLst>
+          </p:cNvPr>
+          <p:cNvCxnSpPr>
+            <a:stCxn id="55" idx="1"/>
+          </p:cNvCxnSpPr>
+          <p:nvPr/>
+        </p:nvCxnSpPr>
+        <p:spPr>
+          <a:xfrm rot="10800000">
+            <a:off x="1734151" y="4272679"/>
+            <a:ext cx="252637" cy="207911"/>
+          </a:xfrm>
+          <a:prstGeom prst="bentConnector2">
+            <a:avLst/>
+          </a:prstGeom>
+        </p:spPr>
+        <p:style>
+          <a:lnRef idx="1">
+            <a:schemeClr val="accent1"/>
+          </a:lnRef>
+          <a:fillRef idx="0">
+            <a:schemeClr val="accent1"/>
+          </a:fillRef>
+          <a:effectRef idx="0">
+            <a:schemeClr val="accent1"/>
+          </a:effectRef>
+          <a:fontRef idx="minor">
+            <a:schemeClr val="tx1"/>
+          </a:fontRef>
+        </p:style>
+      </p:cxnSp>
+      <p:pic>
+        <p:nvPicPr>
+          <p:cNvPr id="2" name="Picture 2" descr="See the source image">
+            <a:extLst>
+              <a:ext uri="{FF2B5EF4-FFF2-40B4-BE49-F238E27FC236}">
+                <a16:creationId xmlns:a16="http://schemas.microsoft.com/office/drawing/2014/main" id="{3BA0CE19-D965-40E9-BCD0-CD0353DF8674}"/>
+              </a:ext>
+            </a:extLst>
+          </p:cNvPr>
+          <p:cNvPicPr>
+            <a:picLocks noChangeAspect="1" noChangeArrowheads="1"/>
+          </p:cNvPicPr>
+          <p:nvPr/>
+        </p:nvPicPr>
+        <p:blipFill>
+          <a:blip r:embed="rId4">
+            <a:extLst>
+              <a:ext uri="{28A0092B-C50C-407E-A947-70E740481C1C}">
+                <a14:useLocalDpi xmlns:a14="http://schemas.microsoft.com/office/drawing/2010/main" val="0"/>
+              </a:ext>
+            </a:extLst>
+          </a:blip>
+          <a:srcRect/>
+          <a:stretch>
+            <a:fillRect/>
+          </a:stretch>
+        </p:blipFill>
+        <p:spPr bwMode="auto">
+          <a:xfrm>
+            <a:off x="2447483" y="1766424"/>
+            <a:ext cx="1213098" cy="535190"/>
+          </a:xfrm>
+          <a:prstGeom prst="rect">
+            <a:avLst/>
+          </a:prstGeom>
+          <a:noFill/>
+          <a:extLst>
+            <a:ext uri="{909E8E84-426E-40DD-AFC4-6F175D3DCCD1}">
+              <a14:hiddenFill xmlns:a14="http://schemas.microsoft.com/office/drawing/2010/main">
+                <a:solidFill>
+                  <a:srgbClr val="FFFFFF"/>
+                </a:solidFill>
+              </a14:hiddenFill>
+            </a:ext>
+          </a:extLst>
+        </p:spPr>
+      </p:pic>
+      <p:grpSp>
+        <p:nvGrpSpPr>
+          <p:cNvPr id="6" name="Group 5">
+            <a:extLst>
+              <a:ext uri="{FF2B5EF4-FFF2-40B4-BE49-F238E27FC236}">
+                <a16:creationId xmlns:a16="http://schemas.microsoft.com/office/drawing/2014/main" id="{055CF6D6-7BAB-4081-83BE-BF87CC5DA668}"/>
+              </a:ext>
+            </a:extLst>
+          </p:cNvPr>
+          <p:cNvGrpSpPr/>
+          <p:nvPr/>
+        </p:nvGrpSpPr>
+        <p:grpSpPr>
+          <a:xfrm>
+            <a:off x="1232982" y="1094992"/>
+            <a:ext cx="996097" cy="604044"/>
+            <a:chOff x="1232982" y="1072084"/>
+            <a:chExt cx="996097" cy="604044"/>
+          </a:xfrm>
+        </p:grpSpPr>
+        <p:sp>
+          <p:nvSpPr>
+            <p:cNvPr id="77" name="Rectangle: Rounded Corners 76">
+              <a:extLst>
+                <a:ext uri="{FF2B5EF4-FFF2-40B4-BE49-F238E27FC236}">
+                  <a16:creationId xmlns:a16="http://schemas.microsoft.com/office/drawing/2014/main" id="{A036A29D-C69D-4AAF-9698-FC8A80F9A110}"/>
+                </a:ext>
+              </a:extLst>
+            </p:cNvPr>
+            <p:cNvSpPr/>
+            <p:nvPr/>
+          </p:nvSpPr>
+          <p:spPr>
+            <a:xfrm>
+              <a:off x="1271250" y="1072084"/>
+              <a:ext cx="919560" cy="604044"/>
+            </a:xfrm>
+            <a:prstGeom prst="roundRect">
+              <a:avLst/>
+            </a:prstGeom>
+            <a:noFill/>
+            <a:ln>
+              <a:solidFill>
+                <a:srgbClr val="0070C0"/>
+              </a:solidFill>
+              <a:prstDash val="sysDot"/>
+              <a:extLst>
+                <a:ext uri="{C807C97D-BFC1-408E-A445-0C87EB9F89A2}">
+                  <ask:lineSketchStyleProps xmlns:ask="http://schemas.microsoft.com/office/drawing/2018/sketchyshapes" sd="1219033472">
+                    <a:custGeom>
+                      <a:avLst/>
+                      <a:gdLst>
+                        <a:gd name="connsiteX0" fmla="*/ 0 w 1060525"/>
+                        <a:gd name="connsiteY0" fmla="*/ 158238 h 949411"/>
+                        <a:gd name="connsiteX1" fmla="*/ 158238 w 1060525"/>
+                        <a:gd name="connsiteY1" fmla="*/ 0 h 949411"/>
+                        <a:gd name="connsiteX2" fmla="*/ 545143 w 1060525"/>
+                        <a:gd name="connsiteY2" fmla="*/ 0 h 949411"/>
+                        <a:gd name="connsiteX3" fmla="*/ 902287 w 1060525"/>
+                        <a:gd name="connsiteY3" fmla="*/ 0 h 949411"/>
+                        <a:gd name="connsiteX4" fmla="*/ 1060525 w 1060525"/>
+                        <a:gd name="connsiteY4" fmla="*/ 158238 h 949411"/>
+                        <a:gd name="connsiteX5" fmla="*/ 1060525 w 1060525"/>
+                        <a:gd name="connsiteY5" fmla="*/ 462047 h 949411"/>
+                        <a:gd name="connsiteX6" fmla="*/ 1060525 w 1060525"/>
+                        <a:gd name="connsiteY6" fmla="*/ 791173 h 949411"/>
+                        <a:gd name="connsiteX7" fmla="*/ 902287 w 1060525"/>
+                        <a:gd name="connsiteY7" fmla="*/ 949411 h 949411"/>
+                        <a:gd name="connsiteX8" fmla="*/ 545143 w 1060525"/>
+                        <a:gd name="connsiteY8" fmla="*/ 949411 h 949411"/>
+                        <a:gd name="connsiteX9" fmla="*/ 158238 w 1060525"/>
+                        <a:gd name="connsiteY9" fmla="*/ 949411 h 949411"/>
+                        <a:gd name="connsiteX10" fmla="*/ 0 w 1060525"/>
+                        <a:gd name="connsiteY10" fmla="*/ 791173 h 949411"/>
+                        <a:gd name="connsiteX11" fmla="*/ 0 w 1060525"/>
+                        <a:gd name="connsiteY11" fmla="*/ 493694 h 949411"/>
+                        <a:gd name="connsiteX12" fmla="*/ 0 w 1060525"/>
+                        <a:gd name="connsiteY12" fmla="*/ 158238 h 949411"/>
+                      </a:gdLst>
+                      <a:ahLst/>
+                      <a:cxnLst>
+                        <a:cxn ang="0">
+                          <a:pos x="connsiteX0" y="connsiteY0"/>
+                        </a:cxn>
+                        <a:cxn ang="0">
+                          <a:pos x="connsiteX1" y="connsiteY1"/>
+                        </a:cxn>
+                        <a:cxn ang="0">
+                          <a:pos x="connsiteX2" y="connsiteY2"/>
+                        </a:cxn>
+                        <a:cxn ang="0">
+                          <a:pos x="connsiteX3" y="connsiteY3"/>
+                        </a:cxn>
+                        <a:cxn ang="0">
+                          <a:pos x="connsiteX4" y="connsiteY4"/>
+                        </a:cxn>
+                        <a:cxn ang="0">
+                          <a:pos x="connsiteX5" y="connsiteY5"/>
+                        </a:cxn>
+                        <a:cxn ang="0">
+                          <a:pos x="connsiteX6" y="connsiteY6"/>
+                        </a:cxn>
+                        <a:cxn ang="0">
+                          <a:pos x="connsiteX7" y="connsiteY7"/>
+                        </a:cxn>
+                        <a:cxn ang="0">
+                          <a:pos x="connsiteX8" y="connsiteY8"/>
+                        </a:cxn>
+                        <a:cxn ang="0">
+                          <a:pos x="connsiteX9" y="connsiteY9"/>
+                        </a:cxn>
+                        <a:cxn ang="0">
+                          <a:pos x="connsiteX10" y="connsiteY10"/>
+                        </a:cxn>
+                        <a:cxn ang="0">
+                          <a:pos x="connsiteX11" y="connsiteY11"/>
+                        </a:cxn>
+                        <a:cxn ang="0">
+                          <a:pos x="connsiteX12" y="connsiteY12"/>
+                        </a:cxn>
+                      </a:cxnLst>
+                      <a:rect l="l" t="t" r="r" b="b"/>
+                      <a:pathLst>
+                        <a:path w="1060525" h="949411" extrusionOk="0">
+                          <a:moveTo>
+                            <a:pt x="0" y="158238"/>
+                          </a:moveTo>
+                          <a:cubicBezTo>
+                            <a:pt x="-6968" y="66548"/>
+                            <a:pt x="48378" y="8433"/>
+                            <a:pt x="158238" y="0"/>
+                          </a:cubicBezTo>
+                          <a:cubicBezTo>
+                            <a:pt x="349666" y="-16998"/>
+                            <a:pt x="425630" y="45732"/>
+                            <a:pt x="545143" y="0"/>
+                          </a:cubicBezTo>
+                          <a:cubicBezTo>
+                            <a:pt x="664657" y="-45732"/>
+                            <a:pt x="820159" y="12596"/>
+                            <a:pt x="902287" y="0"/>
+                          </a:cubicBezTo>
+                          <a:cubicBezTo>
+                            <a:pt x="971578" y="-9904"/>
+                            <a:pt x="1073159" y="76883"/>
+                            <a:pt x="1060525" y="158238"/>
+                          </a:cubicBezTo>
+                          <a:cubicBezTo>
+                            <a:pt x="1070157" y="289612"/>
+                            <a:pt x="1042806" y="329690"/>
+                            <a:pt x="1060525" y="462047"/>
+                          </a:cubicBezTo>
+                          <a:cubicBezTo>
+                            <a:pt x="1078244" y="594404"/>
+                            <a:pt x="1038376" y="643113"/>
+                            <a:pt x="1060525" y="791173"/>
+                          </a:cubicBezTo>
+                          <a:cubicBezTo>
+                            <a:pt x="1059057" y="864564"/>
+                            <a:pt x="981426" y="960880"/>
+                            <a:pt x="902287" y="949411"/>
+                          </a:cubicBezTo>
+                          <a:cubicBezTo>
+                            <a:pt x="753690" y="960561"/>
+                            <a:pt x="631505" y="915417"/>
+                            <a:pt x="545143" y="949411"/>
+                          </a:cubicBezTo>
+                          <a:cubicBezTo>
+                            <a:pt x="458781" y="983405"/>
+                            <a:pt x="339279" y="911965"/>
+                            <a:pt x="158238" y="949411"/>
+                          </a:cubicBezTo>
+                          <a:cubicBezTo>
+                            <a:pt x="73589" y="953494"/>
+                            <a:pt x="1058" y="889527"/>
+                            <a:pt x="0" y="791173"/>
+                          </a:cubicBezTo>
+                          <a:cubicBezTo>
+                            <a:pt x="-31957" y="731446"/>
+                            <a:pt x="21377" y="595516"/>
+                            <a:pt x="0" y="493694"/>
+                          </a:cubicBezTo>
+                          <a:cubicBezTo>
+                            <a:pt x="-21377" y="391872"/>
+                            <a:pt x="35644" y="296102"/>
+                            <a:pt x="0" y="158238"/>
+                          </a:cubicBezTo>
+                          <a:close/>
+                        </a:path>
+                      </a:pathLst>
+                    </a:custGeom>
+                    <ask:type>
+                      <ask:lineSketchNone/>
+                    </ask:type>
+                  </ask:lineSketchStyleProps>
+                </a:ext>
+              </a:extLst>
+            </a:ln>
+          </p:spPr>
+          <p:style>
+            <a:lnRef idx="2">
+              <a:schemeClr val="accent1">
+                <a:shade val="50000"/>
+              </a:schemeClr>
+            </a:lnRef>
+            <a:fillRef idx="1">
+              <a:schemeClr val="accent1"/>
+            </a:fillRef>
+            <a:effectRef idx="0">
+              <a:schemeClr val="accent1"/>
+            </a:effectRef>
+            <a:fontRef idx="minor">
+              <a:schemeClr val="lt1"/>
+            </a:fontRef>
+          </p:style>
+          <p:txBody>
+            <a:bodyPr rtlCol="0" anchor="ctr"/>
+            <a:lstStyle/>
+            <a:p>
+              <a:pPr marL="0" marR="0" lvl="0" indent="0" algn="ctr" defTabSz="914400" rtl="0" eaLnBrk="1" fontAlgn="auto" latinLnBrk="0" hangingPunct="1">
+                <a:lnSpc>
+                  <a:spcPct val="100000"/>
+                </a:lnSpc>
+                <a:spcBef>
+                  <a:spcPts val="0"/>
+                </a:spcBef>
+                <a:spcAft>
+                  <a:spcPts val="0"/>
+                </a:spcAft>
+                <a:buClrTx/>
+                <a:buSzTx/>
+                <a:buFontTx/>
+                <a:buNone/>
+                <a:tabLst/>
+                <a:defRPr/>
+              </a:pPr>
+              <a:endParaRPr kumimoji="0" lang="en-US" sz="1800" b="0" i="0" u="none" strike="noStrike" kern="1200" cap="none" spc="0" normalizeH="0" baseline="0" noProof="0">
+                <a:ln>
+                  <a:noFill/>
+                </a:ln>
+                <a:solidFill>
+                  <a:prstClr val="white"/>
+                </a:solidFill>
+                <a:effectLst/>
+                <a:uLnTx/>
+                <a:uFillTx/>
+                <a:latin typeface="Segoe UI"/>
+                <a:ea typeface="+mn-ea"/>
+                <a:cs typeface="+mn-cs"/>
+              </a:endParaRPr>
+            </a:p>
+          </p:txBody>
+        </p:sp>
+        <p:sp>
+          <p:nvSpPr>
+            <p:cNvPr id="78" name="TextBox 77">
+              <a:extLst>
+                <a:ext uri="{FF2B5EF4-FFF2-40B4-BE49-F238E27FC236}">
+                  <a16:creationId xmlns:a16="http://schemas.microsoft.com/office/drawing/2014/main" id="{0C88F7D7-30F5-477C-A761-EC3915DBEABC}"/>
+                </a:ext>
+              </a:extLst>
+            </p:cNvPr>
+            <p:cNvSpPr txBox="1"/>
+            <p:nvPr/>
+          </p:nvSpPr>
+          <p:spPr>
+            <a:xfrm>
+              <a:off x="1232982" y="1446533"/>
+              <a:ext cx="996097" cy="215444"/>
+            </a:xfrm>
+            <a:prstGeom prst="rect">
+              <a:avLst/>
+            </a:prstGeom>
+            <a:noFill/>
+          </p:spPr>
+          <p:txBody>
+            <a:bodyPr wrap="square" rtlCol="0">
+              <a:spAutoFit/>
+            </a:bodyPr>
+            <a:lstStyle/>
+            <a:p>
+              <a:pPr marL="0" marR="0" lvl="0" indent="0" algn="ctr" defTabSz="914400" rtl="0" eaLnBrk="1" fontAlgn="auto" latinLnBrk="0" hangingPunct="1">
+                <a:lnSpc>
+                  <a:spcPct val="100000"/>
+                </a:lnSpc>
+                <a:spcBef>
+                  <a:spcPts val="0"/>
+                </a:spcBef>
+                <a:spcAft>
+                  <a:spcPts val="0"/>
+                </a:spcAft>
+                <a:buClrTx/>
+                <a:buSzTx/>
+                <a:buFontTx/>
+                <a:buNone/>
+                <a:tabLst/>
+                <a:defRPr/>
+              </a:pPr>
+              <a:r>
+                <a:rPr kumimoji="0" lang="en-US" sz="800" b="0" i="0" u="none" strike="noStrike" kern="1200" cap="none" spc="0" normalizeH="0" baseline="0" noProof="0" dirty="0">
+                  <a:ln>
+                    <a:noFill/>
+                  </a:ln>
+                  <a:solidFill>
+                    <a:prstClr val="black"/>
+                  </a:solidFill>
+                  <a:effectLst/>
+                  <a:uLnTx/>
+                  <a:uFillTx/>
+                  <a:latin typeface="Segoe UI Semibold" panose="020B0702040204020203" pitchFamily="34" charset="0"/>
+                  <a:ea typeface="+mn-ea"/>
+                  <a:cs typeface="Segoe UI Semibold" panose="020B0702040204020203" pitchFamily="34" charset="0"/>
+                </a:rPr>
+                <a:t>Azure</a:t>
+              </a:r>
+            </a:p>
+          </p:txBody>
+        </p:sp>
+        <p:pic>
+          <p:nvPicPr>
+            <p:cNvPr id="4" name="Graphic 3">
+              <a:extLst>
+                <a:ext uri="{FF2B5EF4-FFF2-40B4-BE49-F238E27FC236}">
+                  <a16:creationId xmlns:a16="http://schemas.microsoft.com/office/drawing/2014/main" id="{E47DDCB9-0B66-4532-90CD-3E88928FD473}"/>
+                </a:ext>
+              </a:extLst>
+            </p:cNvPr>
+            <p:cNvPicPr>
+              <a:picLocks noChangeAspect="1"/>
+            </p:cNvPicPr>
+            <p:nvPr/>
+          </p:nvPicPr>
+          <p:blipFill>
+            <a:blip r:embed="rId5">
+              <a:extLst>
+                <a:ext uri="{28A0092B-C50C-407E-A947-70E740481C1C}">
+                  <a14:useLocalDpi xmlns:a14="http://schemas.microsoft.com/office/drawing/2010/main" val="0"/>
+                </a:ext>
+                <a:ext uri="{96DAC541-7B7A-43D3-8B79-37D633B846F1}">
+                  <asvg:svgBlip xmlns:asvg="http://schemas.microsoft.com/office/drawing/2016/SVG/main" r:embed="rId6"/>
+                </a:ext>
+              </a:extLst>
+            </a:blip>
+            <a:stretch>
+              <a:fillRect/>
+            </a:stretch>
+          </p:blipFill>
+          <p:spPr>
+            <a:xfrm>
+              <a:off x="1576504" y="1143223"/>
+              <a:ext cx="309053" cy="309053"/>
+            </a:xfrm>
+            <a:prstGeom prst="rect">
+              <a:avLst/>
+            </a:prstGeom>
+          </p:spPr>
+        </p:pic>
+      </p:grpSp>
+      <p:grpSp>
+        <p:nvGrpSpPr>
+          <p:cNvPr id="58" name="Group 57">
+            <a:extLst>
+              <a:ext uri="{FF2B5EF4-FFF2-40B4-BE49-F238E27FC236}">
+                <a16:creationId xmlns:a16="http://schemas.microsoft.com/office/drawing/2014/main" id="{9B014ED5-D995-490E-8424-BEC7EEEEC6B4}"/>
+              </a:ext>
+            </a:extLst>
+          </p:cNvPr>
+          <p:cNvGrpSpPr/>
+          <p:nvPr/>
+        </p:nvGrpSpPr>
+        <p:grpSpPr>
+          <a:xfrm>
+            <a:off x="4029777" y="1094992"/>
+            <a:ext cx="996097" cy="604044"/>
+            <a:chOff x="1232982" y="1072084"/>
+            <a:chExt cx="996097" cy="604044"/>
+          </a:xfrm>
+        </p:grpSpPr>
+        <p:sp>
+          <p:nvSpPr>
+            <p:cNvPr id="59" name="Rectangle: Rounded Corners 58">
+              <a:extLst>
+                <a:ext uri="{FF2B5EF4-FFF2-40B4-BE49-F238E27FC236}">
+                  <a16:creationId xmlns:a16="http://schemas.microsoft.com/office/drawing/2014/main" id="{CADA561D-BB1F-4B91-A506-82905E225DF2}"/>
+                </a:ext>
+              </a:extLst>
+            </p:cNvPr>
+            <p:cNvSpPr/>
+            <p:nvPr/>
+          </p:nvSpPr>
+          <p:spPr>
+            <a:xfrm>
+              <a:off x="1271250" y="1072084"/>
+              <a:ext cx="919560" cy="604044"/>
+            </a:xfrm>
+            <a:prstGeom prst="roundRect">
+              <a:avLst/>
+            </a:prstGeom>
+            <a:noFill/>
+            <a:ln>
+              <a:solidFill>
+                <a:srgbClr val="0070C0"/>
+              </a:solidFill>
+              <a:prstDash val="sysDot"/>
+              <a:extLst>
+                <a:ext uri="{C807C97D-BFC1-408E-A445-0C87EB9F89A2}">
+                  <ask:lineSketchStyleProps xmlns:ask="http://schemas.microsoft.com/office/drawing/2018/sketchyshapes" sd="1219033472">
+                    <a:custGeom>
+                      <a:avLst/>
+                      <a:gdLst>
+                        <a:gd name="connsiteX0" fmla="*/ 0 w 1060525"/>
+                        <a:gd name="connsiteY0" fmla="*/ 158238 h 949411"/>
+                        <a:gd name="connsiteX1" fmla="*/ 158238 w 1060525"/>
+                        <a:gd name="connsiteY1" fmla="*/ 0 h 949411"/>
+                        <a:gd name="connsiteX2" fmla="*/ 545143 w 1060525"/>
+                        <a:gd name="connsiteY2" fmla="*/ 0 h 949411"/>
+                        <a:gd name="connsiteX3" fmla="*/ 902287 w 1060525"/>
+                        <a:gd name="connsiteY3" fmla="*/ 0 h 949411"/>
+                        <a:gd name="connsiteX4" fmla="*/ 1060525 w 1060525"/>
+                        <a:gd name="connsiteY4" fmla="*/ 158238 h 949411"/>
+                        <a:gd name="connsiteX5" fmla="*/ 1060525 w 1060525"/>
+                        <a:gd name="connsiteY5" fmla="*/ 462047 h 949411"/>
+                        <a:gd name="connsiteX6" fmla="*/ 1060525 w 1060525"/>
+                        <a:gd name="connsiteY6" fmla="*/ 791173 h 949411"/>
+                        <a:gd name="connsiteX7" fmla="*/ 902287 w 1060525"/>
+                        <a:gd name="connsiteY7" fmla="*/ 949411 h 949411"/>
+                        <a:gd name="connsiteX8" fmla="*/ 545143 w 1060525"/>
+                        <a:gd name="connsiteY8" fmla="*/ 949411 h 949411"/>
+                        <a:gd name="connsiteX9" fmla="*/ 158238 w 1060525"/>
+                        <a:gd name="connsiteY9" fmla="*/ 949411 h 949411"/>
+                        <a:gd name="connsiteX10" fmla="*/ 0 w 1060525"/>
+                        <a:gd name="connsiteY10" fmla="*/ 791173 h 949411"/>
+                        <a:gd name="connsiteX11" fmla="*/ 0 w 1060525"/>
+                        <a:gd name="connsiteY11" fmla="*/ 493694 h 949411"/>
+                        <a:gd name="connsiteX12" fmla="*/ 0 w 1060525"/>
+                        <a:gd name="connsiteY12" fmla="*/ 158238 h 949411"/>
+                      </a:gdLst>
+                      <a:ahLst/>
+                      <a:cxnLst>
+                        <a:cxn ang="0">
+                          <a:pos x="connsiteX0" y="connsiteY0"/>
+                        </a:cxn>
+                        <a:cxn ang="0">
+                          <a:pos x="connsiteX1" y="connsiteY1"/>
+                        </a:cxn>
+                        <a:cxn ang="0">
+                          <a:pos x="connsiteX2" y="connsiteY2"/>
+                        </a:cxn>
+                        <a:cxn ang="0">
+                          <a:pos x="connsiteX3" y="connsiteY3"/>
+                        </a:cxn>
+                        <a:cxn ang="0">
+                          <a:pos x="connsiteX4" y="connsiteY4"/>
+                        </a:cxn>
+                        <a:cxn ang="0">
+                          <a:pos x="connsiteX5" y="connsiteY5"/>
+                        </a:cxn>
+                        <a:cxn ang="0">
+                          <a:pos x="connsiteX6" y="connsiteY6"/>
+                        </a:cxn>
+                        <a:cxn ang="0">
+                          <a:pos x="connsiteX7" y="connsiteY7"/>
+                        </a:cxn>
+                        <a:cxn ang="0">
+                          <a:pos x="connsiteX8" y="connsiteY8"/>
+                        </a:cxn>
+                        <a:cxn ang="0">
+                          <a:pos x="connsiteX9" y="connsiteY9"/>
+                        </a:cxn>
+                        <a:cxn ang="0">
+                          <a:pos x="connsiteX10" y="connsiteY10"/>
+                        </a:cxn>
+                        <a:cxn ang="0">
+                          <a:pos x="connsiteX11" y="connsiteY11"/>
+                        </a:cxn>
+                        <a:cxn ang="0">
+                          <a:pos x="connsiteX12" y="connsiteY12"/>
+                        </a:cxn>
+                      </a:cxnLst>
+                      <a:rect l="l" t="t" r="r" b="b"/>
+                      <a:pathLst>
+                        <a:path w="1060525" h="949411" extrusionOk="0">
+                          <a:moveTo>
+                            <a:pt x="0" y="158238"/>
+                          </a:moveTo>
+                          <a:cubicBezTo>
+                            <a:pt x="-6968" y="66548"/>
+                            <a:pt x="48378" y="8433"/>
+                            <a:pt x="158238" y="0"/>
+                          </a:cubicBezTo>
+                          <a:cubicBezTo>
+                            <a:pt x="349666" y="-16998"/>
+                            <a:pt x="425630" y="45732"/>
+                            <a:pt x="545143" y="0"/>
+                          </a:cubicBezTo>
+                          <a:cubicBezTo>
+                            <a:pt x="664657" y="-45732"/>
+                            <a:pt x="820159" y="12596"/>
+                            <a:pt x="902287" y="0"/>
+                          </a:cubicBezTo>
+                          <a:cubicBezTo>
+                            <a:pt x="971578" y="-9904"/>
+                            <a:pt x="1073159" y="76883"/>
+                            <a:pt x="1060525" y="158238"/>
+                          </a:cubicBezTo>
+                          <a:cubicBezTo>
+                            <a:pt x="1070157" y="289612"/>
+                            <a:pt x="1042806" y="329690"/>
+                            <a:pt x="1060525" y="462047"/>
+                          </a:cubicBezTo>
+                          <a:cubicBezTo>
+                            <a:pt x="1078244" y="594404"/>
+                            <a:pt x="1038376" y="643113"/>
+                            <a:pt x="1060525" y="791173"/>
+                          </a:cubicBezTo>
+                          <a:cubicBezTo>
+                            <a:pt x="1059057" y="864564"/>
+                            <a:pt x="981426" y="960880"/>
+                            <a:pt x="902287" y="949411"/>
+                          </a:cubicBezTo>
+                          <a:cubicBezTo>
+                            <a:pt x="753690" y="960561"/>
+                            <a:pt x="631505" y="915417"/>
+                            <a:pt x="545143" y="949411"/>
+                          </a:cubicBezTo>
+                          <a:cubicBezTo>
+                            <a:pt x="458781" y="983405"/>
+                            <a:pt x="339279" y="911965"/>
+                            <a:pt x="158238" y="949411"/>
+                          </a:cubicBezTo>
+                          <a:cubicBezTo>
+                            <a:pt x="73589" y="953494"/>
+                            <a:pt x="1058" y="889527"/>
+                            <a:pt x="0" y="791173"/>
+                          </a:cubicBezTo>
+                          <a:cubicBezTo>
+                            <a:pt x="-31957" y="731446"/>
+                            <a:pt x="21377" y="595516"/>
+                            <a:pt x="0" y="493694"/>
+                          </a:cubicBezTo>
+                          <a:cubicBezTo>
+                            <a:pt x="-21377" y="391872"/>
+                            <a:pt x="35644" y="296102"/>
+                            <a:pt x="0" y="158238"/>
+                          </a:cubicBezTo>
+                          <a:close/>
+                        </a:path>
+                      </a:pathLst>
+                    </a:custGeom>
+                    <ask:type>
+                      <ask:lineSketchNone/>
+                    </ask:type>
+                  </ask:lineSketchStyleProps>
+                </a:ext>
+              </a:extLst>
+            </a:ln>
+          </p:spPr>
+          <p:style>
+            <a:lnRef idx="2">
+              <a:schemeClr val="accent1">
+                <a:shade val="50000"/>
+              </a:schemeClr>
+            </a:lnRef>
+            <a:fillRef idx="1">
+              <a:schemeClr val="accent1"/>
+            </a:fillRef>
+            <a:effectRef idx="0">
+              <a:schemeClr val="accent1"/>
+            </a:effectRef>
+            <a:fontRef idx="minor">
+              <a:schemeClr val="lt1"/>
+            </a:fontRef>
+          </p:style>
+          <p:txBody>
+            <a:bodyPr rtlCol="0" anchor="ctr"/>
+            <a:lstStyle/>
+            <a:p>
+              <a:pPr marL="0" marR="0" lvl="0" indent="0" algn="ctr" defTabSz="914400" rtl="0" eaLnBrk="1" fontAlgn="auto" latinLnBrk="0" hangingPunct="1">
+                <a:lnSpc>
+                  <a:spcPct val="100000"/>
+                </a:lnSpc>
+                <a:spcBef>
+                  <a:spcPts val="0"/>
+                </a:spcBef>
+                <a:spcAft>
+                  <a:spcPts val="0"/>
+                </a:spcAft>
+                <a:buClrTx/>
+                <a:buSzTx/>
+                <a:buFontTx/>
+                <a:buNone/>
+                <a:tabLst/>
+                <a:defRPr/>
+              </a:pPr>
+              <a:endParaRPr kumimoji="0" lang="en-US" sz="1800" b="0" i="0" u="none" strike="noStrike" kern="1200" cap="none" spc="0" normalizeH="0" baseline="0" noProof="0">
+                <a:ln>
+                  <a:noFill/>
+                </a:ln>
+                <a:solidFill>
+                  <a:prstClr val="white"/>
+                </a:solidFill>
+                <a:effectLst/>
+                <a:uLnTx/>
+                <a:uFillTx/>
+                <a:latin typeface="Segoe UI"/>
+                <a:ea typeface="+mn-ea"/>
+                <a:cs typeface="+mn-cs"/>
+              </a:endParaRPr>
+            </a:p>
+          </p:txBody>
+        </p:sp>
+        <p:sp>
+          <p:nvSpPr>
+            <p:cNvPr id="60" name="TextBox 59">
+              <a:extLst>
+                <a:ext uri="{FF2B5EF4-FFF2-40B4-BE49-F238E27FC236}">
+                  <a16:creationId xmlns:a16="http://schemas.microsoft.com/office/drawing/2014/main" id="{148A07DE-CD97-445E-85E0-4ABAE022BF3D}"/>
+                </a:ext>
+              </a:extLst>
+            </p:cNvPr>
+            <p:cNvSpPr txBox="1"/>
+            <p:nvPr/>
+          </p:nvSpPr>
+          <p:spPr>
+            <a:xfrm>
+              <a:off x="1232982" y="1446533"/>
+              <a:ext cx="996097" cy="215444"/>
+            </a:xfrm>
+            <a:prstGeom prst="rect">
+              <a:avLst/>
+            </a:prstGeom>
+            <a:noFill/>
+          </p:spPr>
+          <p:txBody>
+            <a:bodyPr wrap="square" rtlCol="0">
+              <a:spAutoFit/>
+            </a:bodyPr>
+            <a:lstStyle/>
+            <a:p>
+              <a:pPr marL="0" marR="0" lvl="0" indent="0" algn="ctr" defTabSz="914400" rtl="0" eaLnBrk="1" fontAlgn="auto" latinLnBrk="0" hangingPunct="1">
+                <a:lnSpc>
+                  <a:spcPct val="100000"/>
+                </a:lnSpc>
+                <a:spcBef>
+                  <a:spcPts val="0"/>
+                </a:spcBef>
+                <a:spcAft>
+                  <a:spcPts val="0"/>
+                </a:spcAft>
+                <a:buClrTx/>
+                <a:buSzTx/>
+                <a:buFontTx/>
+                <a:buNone/>
+                <a:tabLst/>
+                <a:defRPr/>
+              </a:pPr>
+              <a:r>
+                <a:rPr kumimoji="0" lang="en-US" sz="800" b="0" i="0" u="none" strike="noStrike" kern="1200" cap="none" spc="0" normalizeH="0" baseline="0" noProof="0" dirty="0">
+                  <a:ln>
+                    <a:noFill/>
+                  </a:ln>
+                  <a:solidFill>
+                    <a:prstClr val="black"/>
+                  </a:solidFill>
+                  <a:effectLst/>
+                  <a:uLnTx/>
+                  <a:uFillTx/>
+                  <a:latin typeface="Segoe UI Semibold" panose="020B0702040204020203" pitchFamily="34" charset="0"/>
+                  <a:ea typeface="+mn-ea"/>
+                  <a:cs typeface="Segoe UI Semibold" panose="020B0702040204020203" pitchFamily="34" charset="0"/>
+                </a:rPr>
+                <a:t>Azure</a:t>
+              </a:r>
+            </a:p>
+          </p:txBody>
+        </p:sp>
+        <p:pic>
+          <p:nvPicPr>
+            <p:cNvPr id="63" name="Graphic 62">
+              <a:extLst>
+                <a:ext uri="{FF2B5EF4-FFF2-40B4-BE49-F238E27FC236}">
+                  <a16:creationId xmlns:a16="http://schemas.microsoft.com/office/drawing/2014/main" id="{80A63635-87A7-42CD-B1BA-E579F8433391}"/>
+                </a:ext>
+              </a:extLst>
+            </p:cNvPr>
+            <p:cNvPicPr>
+              <a:picLocks noChangeAspect="1"/>
+            </p:cNvPicPr>
+            <p:nvPr/>
+          </p:nvPicPr>
+          <p:blipFill>
+            <a:blip r:embed="rId5">
+              <a:extLst>
+                <a:ext uri="{28A0092B-C50C-407E-A947-70E740481C1C}">
+                  <a14:useLocalDpi xmlns:a14="http://schemas.microsoft.com/office/drawing/2010/main" val="0"/>
+                </a:ext>
+                <a:ext uri="{96DAC541-7B7A-43D3-8B79-37D633B846F1}">
+                  <asvg:svgBlip xmlns:asvg="http://schemas.microsoft.com/office/drawing/2016/SVG/main" r:embed="rId6"/>
+                </a:ext>
+              </a:extLst>
+            </a:blip>
+            <a:stretch>
+              <a:fillRect/>
+            </a:stretch>
+          </p:blipFill>
+          <p:spPr>
+            <a:xfrm>
+              <a:off x="1576504" y="1143223"/>
+              <a:ext cx="309053" cy="309053"/>
+            </a:xfrm>
+            <a:prstGeom prst="rect">
+              <a:avLst/>
+            </a:prstGeom>
+          </p:spPr>
+        </p:pic>
+      </p:grpSp>
+      <p:grpSp>
+        <p:nvGrpSpPr>
+          <p:cNvPr id="64" name="Group 63">
+            <a:extLst>
+              <a:ext uri="{FF2B5EF4-FFF2-40B4-BE49-F238E27FC236}">
+                <a16:creationId xmlns:a16="http://schemas.microsoft.com/office/drawing/2014/main" id="{35FFAA4A-8184-432A-B62A-5DE24C787E75}"/>
+              </a:ext>
+            </a:extLst>
+          </p:cNvPr>
+          <p:cNvGrpSpPr/>
+          <p:nvPr/>
+        </p:nvGrpSpPr>
+        <p:grpSpPr>
+          <a:xfrm>
+            <a:off x="6428132" y="1094992"/>
+            <a:ext cx="996097" cy="604044"/>
+            <a:chOff x="1232982" y="1072084"/>
+            <a:chExt cx="996097" cy="604044"/>
+          </a:xfrm>
+        </p:grpSpPr>
+        <p:sp>
+          <p:nvSpPr>
+            <p:cNvPr id="65" name="Rectangle: Rounded Corners 64">
+              <a:extLst>
+                <a:ext uri="{FF2B5EF4-FFF2-40B4-BE49-F238E27FC236}">
+                  <a16:creationId xmlns:a16="http://schemas.microsoft.com/office/drawing/2014/main" id="{484CCA70-BFAB-43F1-9A2E-3DB08D789922}"/>
+                </a:ext>
+              </a:extLst>
+            </p:cNvPr>
+            <p:cNvSpPr/>
+            <p:nvPr/>
+          </p:nvSpPr>
+          <p:spPr>
+            <a:xfrm>
+              <a:off x="1271250" y="1072084"/>
+              <a:ext cx="919560" cy="604044"/>
+            </a:xfrm>
+            <a:prstGeom prst="roundRect">
+              <a:avLst/>
+            </a:prstGeom>
+            <a:noFill/>
+            <a:ln>
+              <a:solidFill>
+                <a:srgbClr val="0070C0"/>
+              </a:solidFill>
+              <a:prstDash val="sysDot"/>
+              <a:extLst>
+                <a:ext uri="{C807C97D-BFC1-408E-A445-0C87EB9F89A2}">
+                  <ask:lineSketchStyleProps xmlns:ask="http://schemas.microsoft.com/office/drawing/2018/sketchyshapes" sd="1219033472">
+                    <a:custGeom>
+                      <a:avLst/>
+                      <a:gdLst>
+                        <a:gd name="connsiteX0" fmla="*/ 0 w 1060525"/>
+                        <a:gd name="connsiteY0" fmla="*/ 158238 h 949411"/>
+                        <a:gd name="connsiteX1" fmla="*/ 158238 w 1060525"/>
+                        <a:gd name="connsiteY1" fmla="*/ 0 h 949411"/>
+                        <a:gd name="connsiteX2" fmla="*/ 545143 w 1060525"/>
+                        <a:gd name="connsiteY2" fmla="*/ 0 h 949411"/>
+                        <a:gd name="connsiteX3" fmla="*/ 902287 w 1060525"/>
+                        <a:gd name="connsiteY3" fmla="*/ 0 h 949411"/>
+                        <a:gd name="connsiteX4" fmla="*/ 1060525 w 1060525"/>
+                        <a:gd name="connsiteY4" fmla="*/ 158238 h 949411"/>
+                        <a:gd name="connsiteX5" fmla="*/ 1060525 w 1060525"/>
+                        <a:gd name="connsiteY5" fmla="*/ 462047 h 949411"/>
+                        <a:gd name="connsiteX6" fmla="*/ 1060525 w 1060525"/>
+                        <a:gd name="connsiteY6" fmla="*/ 791173 h 949411"/>
+                        <a:gd name="connsiteX7" fmla="*/ 902287 w 1060525"/>
+                        <a:gd name="connsiteY7" fmla="*/ 949411 h 949411"/>
+                        <a:gd name="connsiteX8" fmla="*/ 545143 w 1060525"/>
+                        <a:gd name="connsiteY8" fmla="*/ 949411 h 949411"/>
+                        <a:gd name="connsiteX9" fmla="*/ 158238 w 1060525"/>
+                        <a:gd name="connsiteY9" fmla="*/ 949411 h 949411"/>
+                        <a:gd name="connsiteX10" fmla="*/ 0 w 1060525"/>
+                        <a:gd name="connsiteY10" fmla="*/ 791173 h 949411"/>
+                        <a:gd name="connsiteX11" fmla="*/ 0 w 1060525"/>
+                        <a:gd name="connsiteY11" fmla="*/ 493694 h 949411"/>
+                        <a:gd name="connsiteX12" fmla="*/ 0 w 1060525"/>
+                        <a:gd name="connsiteY12" fmla="*/ 158238 h 949411"/>
+                      </a:gdLst>
+                      <a:ahLst/>
+                      <a:cxnLst>
+                        <a:cxn ang="0">
+                          <a:pos x="connsiteX0" y="connsiteY0"/>
+                        </a:cxn>
+                        <a:cxn ang="0">
+                          <a:pos x="connsiteX1" y="connsiteY1"/>
+                        </a:cxn>
+                        <a:cxn ang="0">
+                          <a:pos x="connsiteX2" y="connsiteY2"/>
+                        </a:cxn>
+                        <a:cxn ang="0">
+                          <a:pos x="connsiteX3" y="connsiteY3"/>
+                        </a:cxn>
+                        <a:cxn ang="0">
+                          <a:pos x="connsiteX4" y="connsiteY4"/>
+                        </a:cxn>
+                        <a:cxn ang="0">
+                          <a:pos x="connsiteX5" y="connsiteY5"/>
+                        </a:cxn>
+                        <a:cxn ang="0">
+                          <a:pos x="connsiteX6" y="connsiteY6"/>
+                        </a:cxn>
+                        <a:cxn ang="0">
+                          <a:pos x="connsiteX7" y="connsiteY7"/>
+                        </a:cxn>
+                        <a:cxn ang="0">
+                          <a:pos x="connsiteX8" y="connsiteY8"/>
+                        </a:cxn>
+                        <a:cxn ang="0">
+                          <a:pos x="connsiteX9" y="connsiteY9"/>
+                        </a:cxn>
+                        <a:cxn ang="0">
+                          <a:pos x="connsiteX10" y="connsiteY10"/>
+                        </a:cxn>
+                        <a:cxn ang="0">
+                          <a:pos x="connsiteX11" y="connsiteY11"/>
+                        </a:cxn>
+                        <a:cxn ang="0">
+                          <a:pos x="connsiteX12" y="connsiteY12"/>
+                        </a:cxn>
+                      </a:cxnLst>
+                      <a:rect l="l" t="t" r="r" b="b"/>
+                      <a:pathLst>
+                        <a:path w="1060525" h="949411" extrusionOk="0">
+                          <a:moveTo>
+                            <a:pt x="0" y="158238"/>
+                          </a:moveTo>
+                          <a:cubicBezTo>
+                            <a:pt x="-6968" y="66548"/>
+                            <a:pt x="48378" y="8433"/>
+                            <a:pt x="158238" y="0"/>
+                          </a:cubicBezTo>
+                          <a:cubicBezTo>
+                            <a:pt x="349666" y="-16998"/>
+                            <a:pt x="425630" y="45732"/>
+                            <a:pt x="545143" y="0"/>
+                          </a:cubicBezTo>
+                          <a:cubicBezTo>
+                            <a:pt x="664657" y="-45732"/>
+                            <a:pt x="820159" y="12596"/>
+                            <a:pt x="902287" y="0"/>
+                          </a:cubicBezTo>
+                          <a:cubicBezTo>
+                            <a:pt x="971578" y="-9904"/>
+                            <a:pt x="1073159" y="76883"/>
+                            <a:pt x="1060525" y="158238"/>
+                          </a:cubicBezTo>
+                          <a:cubicBezTo>
+                            <a:pt x="1070157" y="289612"/>
+                            <a:pt x="1042806" y="329690"/>
+                            <a:pt x="1060525" y="462047"/>
+                          </a:cubicBezTo>
+                          <a:cubicBezTo>
+                            <a:pt x="1078244" y="594404"/>
+                            <a:pt x="1038376" y="643113"/>
+                            <a:pt x="1060525" y="791173"/>
+                          </a:cubicBezTo>
+                          <a:cubicBezTo>
+                            <a:pt x="1059057" y="864564"/>
+                            <a:pt x="981426" y="960880"/>
+                            <a:pt x="902287" y="949411"/>
+                          </a:cubicBezTo>
+                          <a:cubicBezTo>
+                            <a:pt x="753690" y="960561"/>
+                            <a:pt x="631505" y="915417"/>
+                            <a:pt x="545143" y="949411"/>
+                          </a:cubicBezTo>
+                          <a:cubicBezTo>
+                            <a:pt x="458781" y="983405"/>
+                            <a:pt x="339279" y="911965"/>
+                            <a:pt x="158238" y="949411"/>
+                          </a:cubicBezTo>
+                          <a:cubicBezTo>
+                            <a:pt x="73589" y="953494"/>
+                            <a:pt x="1058" y="889527"/>
+                            <a:pt x="0" y="791173"/>
+                          </a:cubicBezTo>
+                          <a:cubicBezTo>
+                            <a:pt x="-31957" y="731446"/>
+                            <a:pt x="21377" y="595516"/>
+                            <a:pt x="0" y="493694"/>
+                          </a:cubicBezTo>
+                          <a:cubicBezTo>
+                            <a:pt x="-21377" y="391872"/>
+                            <a:pt x="35644" y="296102"/>
+                            <a:pt x="0" y="158238"/>
+                          </a:cubicBezTo>
+                          <a:close/>
+                        </a:path>
+                      </a:pathLst>
+                    </a:custGeom>
+                    <ask:type>
+                      <ask:lineSketchNone/>
+                    </ask:type>
+                  </ask:lineSketchStyleProps>
+                </a:ext>
+              </a:extLst>
+            </a:ln>
+          </p:spPr>
+          <p:style>
+            <a:lnRef idx="2">
+              <a:schemeClr val="accent1">
+                <a:shade val="50000"/>
+              </a:schemeClr>
+            </a:lnRef>
+            <a:fillRef idx="1">
+              <a:schemeClr val="accent1"/>
+            </a:fillRef>
+            <a:effectRef idx="0">
+              <a:schemeClr val="accent1"/>
+            </a:effectRef>
+            <a:fontRef idx="minor">
+              <a:schemeClr val="lt1"/>
+            </a:fontRef>
+          </p:style>
+          <p:txBody>
+            <a:bodyPr rtlCol="0" anchor="ctr"/>
+            <a:lstStyle/>
+            <a:p>
+              <a:pPr marL="0" marR="0" lvl="0" indent="0" algn="ctr" defTabSz="914400" rtl="0" eaLnBrk="1" fontAlgn="auto" latinLnBrk="0" hangingPunct="1">
+                <a:lnSpc>
+                  <a:spcPct val="100000"/>
+                </a:lnSpc>
+                <a:spcBef>
+                  <a:spcPts val="0"/>
+                </a:spcBef>
+                <a:spcAft>
+                  <a:spcPts val="0"/>
+                </a:spcAft>
+                <a:buClrTx/>
+                <a:buSzTx/>
+                <a:buFontTx/>
+                <a:buNone/>
+                <a:tabLst/>
+                <a:defRPr/>
+              </a:pPr>
+              <a:endParaRPr kumimoji="0" lang="en-US" sz="1800" b="0" i="0" u="none" strike="noStrike" kern="1200" cap="none" spc="0" normalizeH="0" baseline="0" noProof="0">
+                <a:ln>
+                  <a:noFill/>
+                </a:ln>
+                <a:solidFill>
+                  <a:prstClr val="white"/>
+                </a:solidFill>
+                <a:effectLst/>
+                <a:uLnTx/>
+                <a:uFillTx/>
+                <a:latin typeface="Segoe UI"/>
+                <a:ea typeface="+mn-ea"/>
+                <a:cs typeface="+mn-cs"/>
+              </a:endParaRPr>
+            </a:p>
+          </p:txBody>
+        </p:sp>
+        <p:sp>
+          <p:nvSpPr>
+            <p:cNvPr id="80" name="TextBox 79">
+              <a:extLst>
+                <a:ext uri="{FF2B5EF4-FFF2-40B4-BE49-F238E27FC236}">
+                  <a16:creationId xmlns:a16="http://schemas.microsoft.com/office/drawing/2014/main" id="{CE4E87AB-6D10-4302-998B-2A9E80F3E619}"/>
+                </a:ext>
+              </a:extLst>
+            </p:cNvPr>
+            <p:cNvSpPr txBox="1"/>
+            <p:nvPr/>
+          </p:nvSpPr>
+          <p:spPr>
+            <a:xfrm>
+              <a:off x="1232982" y="1446533"/>
+              <a:ext cx="996097" cy="215444"/>
+            </a:xfrm>
+            <a:prstGeom prst="rect">
+              <a:avLst/>
+            </a:prstGeom>
+            <a:noFill/>
+          </p:spPr>
+          <p:txBody>
+            <a:bodyPr wrap="square" rtlCol="0">
+              <a:spAutoFit/>
+            </a:bodyPr>
+            <a:lstStyle/>
+            <a:p>
+              <a:pPr marL="0" marR="0" lvl="0" indent="0" algn="ctr" defTabSz="914400" rtl="0" eaLnBrk="1" fontAlgn="auto" latinLnBrk="0" hangingPunct="1">
+                <a:lnSpc>
+                  <a:spcPct val="100000"/>
+                </a:lnSpc>
+                <a:spcBef>
+                  <a:spcPts val="0"/>
+                </a:spcBef>
+                <a:spcAft>
+                  <a:spcPts val="0"/>
+                </a:spcAft>
+                <a:buClrTx/>
+                <a:buSzTx/>
+                <a:buFontTx/>
+                <a:buNone/>
+                <a:tabLst/>
+                <a:defRPr/>
+              </a:pPr>
+              <a:r>
+                <a:rPr kumimoji="0" lang="en-US" sz="800" b="0" i="0" u="none" strike="noStrike" kern="1200" cap="none" spc="0" normalizeH="0" baseline="0" noProof="0" dirty="0">
+                  <a:ln>
+                    <a:noFill/>
+                  </a:ln>
+                  <a:solidFill>
+                    <a:prstClr val="black"/>
+                  </a:solidFill>
+                  <a:effectLst/>
+                  <a:uLnTx/>
+                  <a:uFillTx/>
+                  <a:latin typeface="Segoe UI Semibold" panose="020B0702040204020203" pitchFamily="34" charset="0"/>
+                  <a:ea typeface="+mn-ea"/>
+                  <a:cs typeface="Segoe UI Semibold" panose="020B0702040204020203" pitchFamily="34" charset="0"/>
+                </a:rPr>
+                <a:t>Azure</a:t>
+              </a:r>
+            </a:p>
+          </p:txBody>
+        </p:sp>
+        <p:pic>
+          <p:nvPicPr>
+            <p:cNvPr id="81" name="Graphic 80">
+              <a:extLst>
+                <a:ext uri="{FF2B5EF4-FFF2-40B4-BE49-F238E27FC236}">
+                  <a16:creationId xmlns:a16="http://schemas.microsoft.com/office/drawing/2014/main" id="{D5CD0899-253B-4BE7-A968-8AD5F7E02BE0}"/>
+                </a:ext>
+              </a:extLst>
+            </p:cNvPr>
+            <p:cNvPicPr>
+              <a:picLocks noChangeAspect="1"/>
+            </p:cNvPicPr>
+            <p:nvPr/>
+          </p:nvPicPr>
+          <p:blipFill>
+            <a:blip r:embed="rId5">
+              <a:extLst>
+                <a:ext uri="{28A0092B-C50C-407E-A947-70E740481C1C}">
+                  <a14:useLocalDpi xmlns:a14="http://schemas.microsoft.com/office/drawing/2010/main" val="0"/>
+                </a:ext>
+                <a:ext uri="{96DAC541-7B7A-43D3-8B79-37D633B846F1}">
+                  <asvg:svgBlip xmlns:asvg="http://schemas.microsoft.com/office/drawing/2016/SVG/main" r:embed="rId6"/>
+                </a:ext>
+              </a:extLst>
+            </a:blip>
+            <a:stretch>
+              <a:fillRect/>
+            </a:stretch>
+          </p:blipFill>
+          <p:spPr>
+            <a:xfrm>
+              <a:off x="1576504" y="1143223"/>
+              <a:ext cx="309053" cy="309053"/>
+            </a:xfrm>
+            <a:prstGeom prst="rect">
+              <a:avLst/>
+            </a:prstGeom>
+          </p:spPr>
+        </p:pic>
+      </p:grpSp>
+      <p:grpSp>
+        <p:nvGrpSpPr>
+          <p:cNvPr id="82" name="Group 81">
+            <a:extLst>
+              <a:ext uri="{FF2B5EF4-FFF2-40B4-BE49-F238E27FC236}">
+                <a16:creationId xmlns:a16="http://schemas.microsoft.com/office/drawing/2014/main" id="{37E117D0-6FDA-4556-B889-EAD7FDA438D2}"/>
+              </a:ext>
+            </a:extLst>
+          </p:cNvPr>
+          <p:cNvGrpSpPr/>
+          <p:nvPr/>
+        </p:nvGrpSpPr>
+        <p:grpSpPr>
+          <a:xfrm>
+            <a:off x="8892288" y="1094992"/>
+            <a:ext cx="996097" cy="604044"/>
+            <a:chOff x="1232982" y="1072084"/>
+            <a:chExt cx="996097" cy="604044"/>
+          </a:xfrm>
+        </p:grpSpPr>
+        <p:sp>
+          <p:nvSpPr>
+            <p:cNvPr id="83" name="Rectangle: Rounded Corners 82">
+              <a:extLst>
+                <a:ext uri="{FF2B5EF4-FFF2-40B4-BE49-F238E27FC236}">
+                  <a16:creationId xmlns:a16="http://schemas.microsoft.com/office/drawing/2014/main" id="{F28203A7-7C46-4385-BA59-0D717D401AE5}"/>
+                </a:ext>
+              </a:extLst>
+            </p:cNvPr>
+            <p:cNvSpPr/>
+            <p:nvPr/>
+          </p:nvSpPr>
+          <p:spPr>
+            <a:xfrm>
+              <a:off x="1271250" y="1072084"/>
+              <a:ext cx="919560" cy="604044"/>
+            </a:xfrm>
+            <a:prstGeom prst="roundRect">
+              <a:avLst/>
+            </a:prstGeom>
+            <a:noFill/>
+            <a:ln>
+              <a:solidFill>
+                <a:srgbClr val="0070C0"/>
+              </a:solidFill>
+              <a:prstDash val="sysDot"/>
+              <a:extLst>
+                <a:ext uri="{C807C97D-BFC1-408E-A445-0C87EB9F89A2}">
+                  <ask:lineSketchStyleProps xmlns:ask="http://schemas.microsoft.com/office/drawing/2018/sketchyshapes" sd="1219033472">
+                    <a:custGeom>
+                      <a:avLst/>
+                      <a:gdLst>
+                        <a:gd name="connsiteX0" fmla="*/ 0 w 1060525"/>
+                        <a:gd name="connsiteY0" fmla="*/ 158238 h 949411"/>
+                        <a:gd name="connsiteX1" fmla="*/ 158238 w 1060525"/>
+                        <a:gd name="connsiteY1" fmla="*/ 0 h 949411"/>
+                        <a:gd name="connsiteX2" fmla="*/ 545143 w 1060525"/>
+                        <a:gd name="connsiteY2" fmla="*/ 0 h 949411"/>
+                        <a:gd name="connsiteX3" fmla="*/ 902287 w 1060525"/>
+                        <a:gd name="connsiteY3" fmla="*/ 0 h 949411"/>
+                        <a:gd name="connsiteX4" fmla="*/ 1060525 w 1060525"/>
+                        <a:gd name="connsiteY4" fmla="*/ 158238 h 949411"/>
+                        <a:gd name="connsiteX5" fmla="*/ 1060525 w 1060525"/>
+                        <a:gd name="connsiteY5" fmla="*/ 462047 h 949411"/>
+                        <a:gd name="connsiteX6" fmla="*/ 1060525 w 1060525"/>
+                        <a:gd name="connsiteY6" fmla="*/ 791173 h 949411"/>
+                        <a:gd name="connsiteX7" fmla="*/ 902287 w 1060525"/>
+                        <a:gd name="connsiteY7" fmla="*/ 949411 h 949411"/>
+                        <a:gd name="connsiteX8" fmla="*/ 545143 w 1060525"/>
+                        <a:gd name="connsiteY8" fmla="*/ 949411 h 949411"/>
+                        <a:gd name="connsiteX9" fmla="*/ 158238 w 1060525"/>
+                        <a:gd name="connsiteY9" fmla="*/ 949411 h 949411"/>
+                        <a:gd name="connsiteX10" fmla="*/ 0 w 1060525"/>
+                        <a:gd name="connsiteY10" fmla="*/ 791173 h 949411"/>
+                        <a:gd name="connsiteX11" fmla="*/ 0 w 1060525"/>
+                        <a:gd name="connsiteY11" fmla="*/ 493694 h 949411"/>
+                        <a:gd name="connsiteX12" fmla="*/ 0 w 1060525"/>
+                        <a:gd name="connsiteY12" fmla="*/ 158238 h 949411"/>
+                      </a:gdLst>
+                      <a:ahLst/>
+                      <a:cxnLst>
+                        <a:cxn ang="0">
+                          <a:pos x="connsiteX0" y="connsiteY0"/>
+                        </a:cxn>
+                        <a:cxn ang="0">
+                          <a:pos x="connsiteX1" y="connsiteY1"/>
+                        </a:cxn>
+                        <a:cxn ang="0">
+                          <a:pos x="connsiteX2" y="connsiteY2"/>
+                        </a:cxn>
+                        <a:cxn ang="0">
+                          <a:pos x="connsiteX3" y="connsiteY3"/>
+                        </a:cxn>
+                        <a:cxn ang="0">
+                          <a:pos x="connsiteX4" y="connsiteY4"/>
+                        </a:cxn>
+                        <a:cxn ang="0">
+                          <a:pos x="connsiteX5" y="connsiteY5"/>
+                        </a:cxn>
+                        <a:cxn ang="0">
+                          <a:pos x="connsiteX6" y="connsiteY6"/>
+                        </a:cxn>
+                        <a:cxn ang="0">
+                          <a:pos x="connsiteX7" y="connsiteY7"/>
+                        </a:cxn>
+                        <a:cxn ang="0">
+                          <a:pos x="connsiteX8" y="connsiteY8"/>
+                        </a:cxn>
+                        <a:cxn ang="0">
+                          <a:pos x="connsiteX9" y="connsiteY9"/>
+                        </a:cxn>
+                        <a:cxn ang="0">
+                          <a:pos x="connsiteX10" y="connsiteY10"/>
+                        </a:cxn>
+                        <a:cxn ang="0">
+                          <a:pos x="connsiteX11" y="connsiteY11"/>
+                        </a:cxn>
+                        <a:cxn ang="0">
+                          <a:pos x="connsiteX12" y="connsiteY12"/>
+                        </a:cxn>
+                      </a:cxnLst>
+                      <a:rect l="l" t="t" r="r" b="b"/>
+                      <a:pathLst>
+                        <a:path w="1060525" h="949411" extrusionOk="0">
+                          <a:moveTo>
+                            <a:pt x="0" y="158238"/>
+                          </a:moveTo>
+                          <a:cubicBezTo>
+                            <a:pt x="-6968" y="66548"/>
+                            <a:pt x="48378" y="8433"/>
+                            <a:pt x="158238" y="0"/>
+                          </a:cubicBezTo>
+                          <a:cubicBezTo>
+                            <a:pt x="349666" y="-16998"/>
+                            <a:pt x="425630" y="45732"/>
+                            <a:pt x="545143" y="0"/>
+                          </a:cubicBezTo>
+                          <a:cubicBezTo>
+                            <a:pt x="664657" y="-45732"/>
+                            <a:pt x="820159" y="12596"/>
+                            <a:pt x="902287" y="0"/>
+                          </a:cubicBezTo>
+                          <a:cubicBezTo>
+                            <a:pt x="971578" y="-9904"/>
+                            <a:pt x="1073159" y="76883"/>
+                            <a:pt x="1060525" y="158238"/>
+                          </a:cubicBezTo>
+                          <a:cubicBezTo>
+                            <a:pt x="1070157" y="289612"/>
+                            <a:pt x="1042806" y="329690"/>
+                            <a:pt x="1060525" y="462047"/>
+                          </a:cubicBezTo>
+                          <a:cubicBezTo>
+                            <a:pt x="1078244" y="594404"/>
+                            <a:pt x="1038376" y="643113"/>
+                            <a:pt x="1060525" y="791173"/>
+                          </a:cubicBezTo>
+                          <a:cubicBezTo>
+                            <a:pt x="1059057" y="864564"/>
+                            <a:pt x="981426" y="960880"/>
+                            <a:pt x="902287" y="949411"/>
+                          </a:cubicBezTo>
+                          <a:cubicBezTo>
+                            <a:pt x="753690" y="960561"/>
+                            <a:pt x="631505" y="915417"/>
+                            <a:pt x="545143" y="949411"/>
+                          </a:cubicBezTo>
+                          <a:cubicBezTo>
+                            <a:pt x="458781" y="983405"/>
+                            <a:pt x="339279" y="911965"/>
+                            <a:pt x="158238" y="949411"/>
+                          </a:cubicBezTo>
+                          <a:cubicBezTo>
+                            <a:pt x="73589" y="953494"/>
+                            <a:pt x="1058" y="889527"/>
+                            <a:pt x="0" y="791173"/>
+                          </a:cubicBezTo>
+                          <a:cubicBezTo>
+                            <a:pt x="-31957" y="731446"/>
+                            <a:pt x="21377" y="595516"/>
+                            <a:pt x="0" y="493694"/>
+                          </a:cubicBezTo>
+                          <a:cubicBezTo>
+                            <a:pt x="-21377" y="391872"/>
+                            <a:pt x="35644" y="296102"/>
+                            <a:pt x="0" y="158238"/>
+                          </a:cubicBezTo>
+                          <a:close/>
+                        </a:path>
+                      </a:pathLst>
+                    </a:custGeom>
+                    <ask:type>
+                      <ask:lineSketchNone/>
+                    </ask:type>
+                  </ask:lineSketchStyleProps>
+                </a:ext>
+              </a:extLst>
+            </a:ln>
+          </p:spPr>
+          <p:style>
+            <a:lnRef idx="2">
+              <a:schemeClr val="accent1">
+                <a:shade val="50000"/>
+              </a:schemeClr>
+            </a:lnRef>
+            <a:fillRef idx="1">
+              <a:schemeClr val="accent1"/>
+            </a:fillRef>
+            <a:effectRef idx="0">
+              <a:schemeClr val="accent1"/>
+            </a:effectRef>
+            <a:fontRef idx="minor">
+              <a:schemeClr val="lt1"/>
+            </a:fontRef>
+          </p:style>
+          <p:txBody>
+            <a:bodyPr rtlCol="0" anchor="ctr"/>
+            <a:lstStyle/>
+            <a:p>
+              <a:pPr marL="0" marR="0" lvl="0" indent="0" algn="ctr" defTabSz="914400" rtl="0" eaLnBrk="1" fontAlgn="auto" latinLnBrk="0" hangingPunct="1">
+                <a:lnSpc>
+                  <a:spcPct val="100000"/>
+                </a:lnSpc>
+                <a:spcBef>
+                  <a:spcPts val="0"/>
+                </a:spcBef>
+                <a:spcAft>
+                  <a:spcPts val="0"/>
+                </a:spcAft>
+                <a:buClrTx/>
+                <a:buSzTx/>
+                <a:buFontTx/>
+                <a:buNone/>
+                <a:tabLst/>
+                <a:defRPr/>
+              </a:pPr>
+              <a:endParaRPr kumimoji="0" lang="en-US" sz="1800" b="0" i="0" u="none" strike="noStrike" kern="1200" cap="none" spc="0" normalizeH="0" baseline="0" noProof="0">
+                <a:ln>
+                  <a:noFill/>
+                </a:ln>
+                <a:solidFill>
+                  <a:prstClr val="white"/>
+                </a:solidFill>
+                <a:effectLst/>
+                <a:uLnTx/>
+                <a:uFillTx/>
+                <a:latin typeface="Segoe UI"/>
+                <a:ea typeface="+mn-ea"/>
+                <a:cs typeface="+mn-cs"/>
+              </a:endParaRPr>
+            </a:p>
+          </p:txBody>
+        </p:sp>
+        <p:sp>
+          <p:nvSpPr>
+            <p:cNvPr id="84" name="TextBox 83">
+              <a:extLst>
+                <a:ext uri="{FF2B5EF4-FFF2-40B4-BE49-F238E27FC236}">
+                  <a16:creationId xmlns:a16="http://schemas.microsoft.com/office/drawing/2014/main" id="{388CEBC1-5C14-4A4A-9C47-F78A894127B4}"/>
+                </a:ext>
+              </a:extLst>
+            </p:cNvPr>
+            <p:cNvSpPr txBox="1"/>
+            <p:nvPr/>
+          </p:nvSpPr>
+          <p:spPr>
+            <a:xfrm>
+              <a:off x="1232982" y="1446533"/>
+              <a:ext cx="996097" cy="215444"/>
+            </a:xfrm>
+            <a:prstGeom prst="rect">
+              <a:avLst/>
+            </a:prstGeom>
+            <a:noFill/>
+          </p:spPr>
+          <p:txBody>
+            <a:bodyPr wrap="square" rtlCol="0">
+              <a:spAutoFit/>
+            </a:bodyPr>
+            <a:lstStyle/>
+            <a:p>
+              <a:pPr marL="0" marR="0" lvl="0" indent="0" algn="ctr" defTabSz="914400" rtl="0" eaLnBrk="1" fontAlgn="auto" latinLnBrk="0" hangingPunct="1">
+                <a:lnSpc>
+                  <a:spcPct val="100000"/>
+                </a:lnSpc>
+                <a:spcBef>
+                  <a:spcPts val="0"/>
+                </a:spcBef>
+                <a:spcAft>
+                  <a:spcPts val="0"/>
+                </a:spcAft>
+                <a:buClrTx/>
+                <a:buSzTx/>
+                <a:buFontTx/>
+                <a:buNone/>
+                <a:tabLst/>
+                <a:defRPr/>
+              </a:pPr>
+              <a:r>
+                <a:rPr kumimoji="0" lang="en-US" sz="800" b="0" i="0" u="none" strike="noStrike" kern="1200" cap="none" spc="0" normalizeH="0" baseline="0" noProof="0" dirty="0">
+                  <a:ln>
+                    <a:noFill/>
+                  </a:ln>
+                  <a:solidFill>
+                    <a:prstClr val="black"/>
+                  </a:solidFill>
+                  <a:effectLst/>
+                  <a:uLnTx/>
+                  <a:uFillTx/>
+                  <a:latin typeface="Segoe UI Semibold" panose="020B0702040204020203" pitchFamily="34" charset="0"/>
+                  <a:ea typeface="+mn-ea"/>
+                  <a:cs typeface="Segoe UI Semibold" panose="020B0702040204020203" pitchFamily="34" charset="0"/>
+                </a:rPr>
+                <a:t>Azure</a:t>
+              </a:r>
+            </a:p>
+          </p:txBody>
+        </p:sp>
+        <p:pic>
+          <p:nvPicPr>
+            <p:cNvPr id="85" name="Graphic 84">
+              <a:extLst>
+                <a:ext uri="{FF2B5EF4-FFF2-40B4-BE49-F238E27FC236}">
+                  <a16:creationId xmlns:a16="http://schemas.microsoft.com/office/drawing/2014/main" id="{9CF463CD-B41E-433F-8ED8-B7352CEFD608}"/>
+                </a:ext>
+              </a:extLst>
+            </p:cNvPr>
+            <p:cNvPicPr>
+              <a:picLocks noChangeAspect="1"/>
+            </p:cNvPicPr>
+            <p:nvPr/>
+          </p:nvPicPr>
+          <p:blipFill>
+            <a:blip r:embed="rId5">
+              <a:extLst>
+                <a:ext uri="{28A0092B-C50C-407E-A947-70E740481C1C}">
+                  <a14:useLocalDpi xmlns:a14="http://schemas.microsoft.com/office/drawing/2010/main" val="0"/>
+                </a:ext>
+                <a:ext uri="{96DAC541-7B7A-43D3-8B79-37D633B846F1}">
+                  <asvg:svgBlip xmlns:asvg="http://schemas.microsoft.com/office/drawing/2016/SVG/main" r:embed="rId6"/>
+                </a:ext>
+              </a:extLst>
+            </a:blip>
+            <a:stretch>
+              <a:fillRect/>
+            </a:stretch>
+          </p:blipFill>
+          <p:spPr>
+            <a:xfrm>
+              <a:off x="1576504" y="1143223"/>
+              <a:ext cx="309053" cy="309053"/>
+            </a:xfrm>
+            <a:prstGeom prst="rect">
+              <a:avLst/>
+            </a:prstGeom>
+          </p:spPr>
+        </p:pic>
+      </p:grpSp>
+    </p:spTree>
+    <p:extLst>
+      <p:ext uri="{BB962C8B-B14F-4D97-AF65-F5344CB8AC3E}">
+        <p14:creationId xmlns:p14="http://schemas.microsoft.com/office/powerpoint/2010/main" val="2712312102"/>
+      </p:ext>
+    </p:extLst>
+  </p:cSld>
+  <p:clrMapOvr>
+    <a:masterClrMapping/>
+  </p:clrMapOvr>
+</p:sld>
+</file>
+
+<file path=ppt/slides/slide3.xml><?xml version="1.0" encoding="utf-8"?>
+<p:sld xmlns:a="http://schemas.openxmlformats.org/drawingml/2006/main" xmlns:r="http://schemas.openxmlformats.org/officeDocument/2006/relationships" xmlns:p="http://schemas.openxmlformats.org/presentationml/2006/main">
+  <p:cSld>
+    <p:spTree>
+      <p:nvGrpSpPr>
+        <p:cNvPr id="1" name=""/>
+        <p:cNvGrpSpPr/>
+        <p:nvPr/>
+      </p:nvGrpSpPr>
+      <p:grpSpPr>
+        <a:xfrm>
+          <a:off x="0" y="0"/>
+          <a:ext cx="0" cy="0"/>
+          <a:chOff x="0" y="0"/>
+          <a:chExt cx="0" cy="0"/>
+        </a:xfrm>
+      </p:grpSpPr>
+      <p:sp>
+        <p:nvSpPr>
           <p:cNvPr id="2" name="Title 1">
             <a:extLst>
               <a:ext uri="{FF2B5EF4-FFF2-40B4-BE49-F238E27FC236}">
@@ -10403,25 +13316,6 @@
 </file>
 
 <file path=customXml/item1.xml><?xml version="1.0" encoding="utf-8"?>
-<?mso-contentType ?>
-<FormTemplates xmlns="http://schemas.microsoft.com/sharepoint/v3/contenttype/forms">
-  <Display>DocumentLibraryForm</Display>
-  <Edit>DocumentLibraryForm</Edit>
-  <New>DocumentLibraryForm</New>
-</FormTemplates>
-</file>
-
-<file path=customXml/item2.xml><?xml version="1.0" encoding="utf-8"?>
-<p:properties xmlns:p="http://schemas.microsoft.com/office/2006/metadata/properties" xmlns:xsi="http://www.w3.org/2001/XMLSchema-instance" xmlns:pc="http://schemas.microsoft.com/office/infopath/2007/PartnerControls">
-  <documentManagement>
-    <_ip_UnifiedCompliancePolicyUIAction xmlns="http://schemas.microsoft.com/sharepoint/v3" xsi:nil="true"/>
-    <_STS_x0020_Hashtags xmlns="912cb619-99d2-4794-acea-8354d3da3f58"/>
-    <_ip_UnifiedCompliancePolicyProperties xmlns="http://schemas.microsoft.com/sharepoint/v3" xsi:nil="true"/>
-  </documentManagement>
-</p:properties>
-</file>
-
-<file path=customXml/item3.xml><?xml version="1.0" encoding="utf-8"?>
 <ct:contentTypeSchema xmlns:ct="http://schemas.microsoft.com/office/2006/metadata/contentType" xmlns:ma="http://schemas.microsoft.com/office/2006/metadata/properties/metaAttributes" ct:_="" ma:_="" ma:contentTypeName="Document" ma:contentTypeID="0x010100E91BF5703B036B41A0430F443AD95DB8" ma:contentTypeVersion="19" ma:contentTypeDescription="Create a new document." ma:contentTypeScope="" ma:versionID="ffaa6361bbca0f44b1c0ce4466c0db6d">
   <xsd:schema xmlns:xsd="http://www.w3.org/2001/XMLSchema" xmlns:xs="http://www.w3.org/2001/XMLSchema" xmlns:p="http://schemas.microsoft.com/office/2006/metadata/properties" xmlns:ns1="http://schemas.microsoft.com/sharepoint/v3" xmlns:ns3="d02dc944-d877-4fdc-84c6-4fb412a3c730" xmlns:ns4="912cb619-99d2-4794-acea-8354d3da3f58" targetNamespace="http://schemas.microsoft.com/office/2006/metadata/properties" ma:root="true" ma:fieldsID="b40e0413ab5e745cbe4ceab969b882de" ns1:_="" ns3:_="" ns4:_="">
     <xsd:import namespace="http://schemas.microsoft.com/sharepoint/v3"/>
@@ -10695,10 +13589,41 @@
 </ct:contentTypeSchema>
 </file>
 
+<file path=customXml/item2.xml><?xml version="1.0" encoding="utf-8"?>
+<p:properties xmlns:p="http://schemas.microsoft.com/office/2006/metadata/properties" xmlns:xsi="http://www.w3.org/2001/XMLSchema-instance" xmlns:pc="http://schemas.microsoft.com/office/infopath/2007/PartnerControls">
+  <documentManagement>
+    <_ip_UnifiedCompliancePolicyUIAction xmlns="http://schemas.microsoft.com/sharepoint/v3" xsi:nil="true"/>
+    <_STS_x0020_Hashtags xmlns="912cb619-99d2-4794-acea-8354d3da3f58"/>
+    <_ip_UnifiedCompliancePolicyProperties xmlns="http://schemas.microsoft.com/sharepoint/v3" xsi:nil="true"/>
+  </documentManagement>
+</p:properties>
+</file>
+
+<file path=customXml/item3.xml><?xml version="1.0" encoding="utf-8"?>
+<?mso-contentType ?>
+<FormTemplates xmlns="http://schemas.microsoft.com/sharepoint/v3/contenttype/forms">
+  <Display>DocumentLibraryForm</Display>
+  <Edit>DocumentLibraryForm</Edit>
+  <New>DocumentLibraryForm</New>
+</FormTemplates>
+</file>
+
 <file path=customXml/itemProps1.xml><?xml version="1.0" encoding="utf-8"?>
-<ds:datastoreItem xmlns:ds="http://schemas.openxmlformats.org/officeDocument/2006/customXml" ds:itemID="{116A9811-A868-4FA1-96A7-0C195F67FCFD}">
+<ds:datastoreItem xmlns:ds="http://schemas.openxmlformats.org/officeDocument/2006/customXml" ds:itemID="{F1D7A875-EC20-4E52-AF72-101135F1265B}">
   <ds:schemaRefs>
-    <ds:schemaRef ds:uri="http://schemas.microsoft.com/sharepoint/v3/contenttype/forms"/>
+    <ds:schemaRef ds:uri="http://schemas.microsoft.com/office/2006/metadata/contentType"/>
+    <ds:schemaRef ds:uri="http://schemas.microsoft.com/office/2006/metadata/properties/metaAttributes"/>
+    <ds:schemaRef ds:uri="http://www.w3.org/2001/XMLSchema"/>
+    <ds:schemaRef ds:uri="http://schemas.microsoft.com/office/2006/metadata/properties"/>
+    <ds:schemaRef ds:uri="http://schemas.microsoft.com/sharepoint/v3"/>
+    <ds:schemaRef ds:uri="d02dc944-d877-4fdc-84c6-4fb412a3c730"/>
+    <ds:schemaRef ds:uri="912cb619-99d2-4794-acea-8354d3da3f58"/>
+    <ds:schemaRef ds:uri="http://schemas.microsoft.com/office/2006/documentManagement/types"/>
+    <ds:schemaRef ds:uri="http://schemas.microsoft.com/office/infopath/2007/PartnerControls"/>
+    <ds:schemaRef ds:uri="http://schemas.openxmlformats.org/package/2006/metadata/core-properties"/>
+    <ds:schemaRef ds:uri="http://purl.org/dc/elements/1.1/"/>
+    <ds:schemaRef ds:uri="http://purl.org/dc/terms/"/>
+    <ds:schemaRef ds:uri="http://schemas.microsoft.com/internal/obd"/>
   </ds:schemaRefs>
 </ds:datastoreItem>
 </file>
@@ -10722,21 +13647,9 @@
 </file>
 
 <file path=customXml/itemProps3.xml><?xml version="1.0" encoding="utf-8"?>
-<ds:datastoreItem xmlns:ds="http://schemas.openxmlformats.org/officeDocument/2006/customXml" ds:itemID="{F1D7A875-EC20-4E52-AF72-101135F1265B}">
+<ds:datastoreItem xmlns:ds="http://schemas.openxmlformats.org/officeDocument/2006/customXml" ds:itemID="{116A9811-A868-4FA1-96A7-0C195F67FCFD}">
   <ds:schemaRefs>
-    <ds:schemaRef ds:uri="http://schemas.microsoft.com/office/2006/metadata/contentType"/>
-    <ds:schemaRef ds:uri="http://schemas.microsoft.com/office/2006/metadata/properties/metaAttributes"/>
-    <ds:schemaRef ds:uri="http://www.w3.org/2001/XMLSchema"/>
-    <ds:schemaRef ds:uri="http://schemas.microsoft.com/office/2006/metadata/properties"/>
-    <ds:schemaRef ds:uri="http://schemas.microsoft.com/sharepoint/v3"/>
-    <ds:schemaRef ds:uri="d02dc944-d877-4fdc-84c6-4fb412a3c730"/>
-    <ds:schemaRef ds:uri="912cb619-99d2-4794-acea-8354d3da3f58"/>
-    <ds:schemaRef ds:uri="http://schemas.microsoft.com/office/2006/documentManagement/types"/>
-    <ds:schemaRef ds:uri="http://schemas.microsoft.com/office/infopath/2007/PartnerControls"/>
-    <ds:schemaRef ds:uri="http://schemas.openxmlformats.org/package/2006/metadata/core-properties"/>
-    <ds:schemaRef ds:uri="http://purl.org/dc/elements/1.1/"/>
-    <ds:schemaRef ds:uri="http://purl.org/dc/terms/"/>
-    <ds:schemaRef ds:uri="http://schemas.microsoft.com/internal/obd"/>
+    <ds:schemaRef ds:uri="http://schemas.microsoft.com/sharepoint/v3/contenttype/forms"/>
   </ds:schemaRefs>
 </ds:datastoreItem>
 </file>
</xml_diff>